<commit_message>
[09.10] Starbucks #2 Header Menu
</commit_message>
<xml_diff>
--- a/팀과제/6팀_2_DBMS.pptx
+++ b/팀과제/6팀_2_DBMS.pptx
@@ -5,7 +5,7 @@
     <p:sldMasterId id="2147483648" r:id="rId1"/>
   </p:sldMasterIdLst>
   <p:notesMasterIdLst>
-    <p:notesMasterId r:id="rId11"/>
+    <p:notesMasterId r:id="rId15"/>
   </p:notesMasterIdLst>
   <p:sldIdLst>
     <p:sldId id="256" r:id="rId2"/>
@@ -14,9 +14,13 @@
     <p:sldId id="259" r:id="rId5"/>
     <p:sldId id="260" r:id="rId6"/>
     <p:sldId id="264" r:id="rId7"/>
-    <p:sldId id="261" r:id="rId8"/>
-    <p:sldId id="263" r:id="rId9"/>
+    <p:sldId id="263" r:id="rId8"/>
+    <p:sldId id="265" r:id="rId9"/>
     <p:sldId id="262" r:id="rId10"/>
+    <p:sldId id="261" r:id="rId11"/>
+    <p:sldId id="268" r:id="rId12"/>
+    <p:sldId id="267" r:id="rId13"/>
+    <p:sldId id="266" r:id="rId14"/>
   </p:sldIdLst>
   <p:sldSz cx="12192000" cy="6858000"/>
   <p:notesSz cx="6858000" cy="9144000"/>
@@ -698,6 +702,90 @@
     <p:extLst>
       <p:ext uri="{BB962C8B-B14F-4D97-AF65-F5344CB8AC3E}">
         <p14:creationId xmlns:p14="http://schemas.microsoft.com/office/powerpoint/2010/main" val="1728945846"/>
+      </p:ext>
+    </p:extLst>
+  </p:cSld>
+  <p:clrMapOvr>
+    <a:masterClrMapping/>
+  </p:clrMapOvr>
+</p:notes>
+</file>
+
+<file path=ppt/notesSlides/notesSlide3.xml><?xml version="1.0" encoding="utf-8"?>
+<p:notes xmlns:a="http://schemas.openxmlformats.org/drawingml/2006/main" xmlns:r="http://schemas.openxmlformats.org/officeDocument/2006/relationships" xmlns:p="http://schemas.openxmlformats.org/presentationml/2006/main">
+  <p:cSld>
+    <p:spTree>
+      <p:nvGrpSpPr>
+        <p:cNvPr id="1" name=""/>
+        <p:cNvGrpSpPr/>
+        <p:nvPr/>
+      </p:nvGrpSpPr>
+      <p:grpSpPr>
+        <a:xfrm>
+          <a:off x="0" y="0"/>
+          <a:ext cx="0" cy="0"/>
+          <a:chOff x="0" y="0"/>
+          <a:chExt cx="0" cy="0"/>
+        </a:xfrm>
+      </p:grpSpPr>
+      <p:sp>
+        <p:nvSpPr>
+          <p:cNvPr id="2" name="슬라이드 이미지 개체 틀 1"/>
+          <p:cNvSpPr>
+            <a:spLocks noGrp="1" noRot="1" noChangeAspect="1"/>
+          </p:cNvSpPr>
+          <p:nvPr>
+            <p:ph type="sldImg"/>
+          </p:nvPr>
+        </p:nvSpPr>
+        <p:spPr/>
+      </p:sp>
+      <p:sp>
+        <p:nvSpPr>
+          <p:cNvPr id="3" name="슬라이드 노트 개체 틀 2"/>
+          <p:cNvSpPr>
+            <a:spLocks noGrp="1"/>
+          </p:cNvSpPr>
+          <p:nvPr>
+            <p:ph type="body" idx="1"/>
+          </p:nvPr>
+        </p:nvSpPr>
+        <p:spPr/>
+        <p:txBody>
+          <a:bodyPr/>
+          <a:lstStyle/>
+          <a:p>
+            <a:endParaRPr kumimoji="1" lang="ko-Kore-KR" altLang="en-US" dirty="0"/>
+          </a:p>
+        </p:txBody>
+      </p:sp>
+      <p:sp>
+        <p:nvSpPr>
+          <p:cNvPr id="4" name="슬라이드 번호 개체 틀 3"/>
+          <p:cNvSpPr>
+            <a:spLocks noGrp="1"/>
+          </p:cNvSpPr>
+          <p:nvPr>
+            <p:ph type="sldNum" sz="quarter" idx="5"/>
+          </p:nvPr>
+        </p:nvSpPr>
+        <p:spPr/>
+        <p:txBody>
+          <a:bodyPr/>
+          <a:lstStyle/>
+          <a:p>
+            <a:fld id="{4C8B3DE2-9D37-9F4D-8A07-FF1CD1FE7D09}" type="slidenum">
+              <a:rPr kumimoji="1" lang="ko-Kore-KR" altLang="en-US" smtClean="0"/>
+              <a:t>8</a:t>
+            </a:fld>
+            <a:endParaRPr kumimoji="1" lang="ko-Kore-KR" altLang="en-US"/>
+          </a:p>
+        </p:txBody>
+      </p:sp>
+    </p:spTree>
+    <p:extLst>
+      <p:ext uri="{BB962C8B-B14F-4D97-AF65-F5344CB8AC3E}">
+        <p14:creationId xmlns:p14="http://schemas.microsoft.com/office/powerpoint/2010/main" val="4266132265"/>
       </p:ext>
     </p:extLst>
   </p:cSld>
@@ -4008,6 +4096,2030 @@
 </p:sld>
 </file>
 
+<file path=ppt/slides/slide10.xml><?xml version="1.0" encoding="utf-8"?>
+<p:sld xmlns:a="http://schemas.openxmlformats.org/drawingml/2006/main" xmlns:r="http://schemas.openxmlformats.org/officeDocument/2006/relationships" xmlns:p="http://schemas.openxmlformats.org/presentationml/2006/main">
+  <p:cSld>
+    <p:spTree>
+      <p:nvGrpSpPr>
+        <p:cNvPr id="1" name=""/>
+        <p:cNvGrpSpPr/>
+        <p:nvPr/>
+      </p:nvGrpSpPr>
+      <p:grpSpPr>
+        <a:xfrm>
+          <a:off x="0" y="0"/>
+          <a:ext cx="0" cy="0"/>
+          <a:chOff x="0" y="0"/>
+          <a:chExt cx="0" cy="0"/>
+        </a:xfrm>
+      </p:grpSpPr>
+      <p:sp>
+        <p:nvSpPr>
+          <p:cNvPr id="2" name="제목 1">
+            <a:extLst>
+              <a:ext uri="{FF2B5EF4-FFF2-40B4-BE49-F238E27FC236}">
+                <a16:creationId xmlns:a16="http://schemas.microsoft.com/office/drawing/2014/main" id="{BAAE6BBC-39C1-4C45-A7B1-41668EF732F7}"/>
+              </a:ext>
+            </a:extLst>
+          </p:cNvPr>
+          <p:cNvSpPr>
+            <a:spLocks noGrp="1"/>
+          </p:cNvSpPr>
+          <p:nvPr>
+            <p:ph type="title"/>
+          </p:nvPr>
+        </p:nvSpPr>
+        <p:spPr/>
+        <p:txBody>
+          <a:bodyPr/>
+          <a:lstStyle/>
+          <a:p>
+            <a:r>
+              <a:rPr kumimoji="1" lang="en-US" altLang="ko-Kore-KR" dirty="0"/>
+              <a:t>SQL(</a:t>
+            </a:r>
+            <a:r>
+              <a:rPr kumimoji="1" lang="ko-KR" altLang="en-US" dirty="0"/>
+              <a:t>관계형 </a:t>
+            </a:r>
+            <a:r>
+              <a:rPr kumimoji="1" lang="en-US" altLang="ko-KR" dirty="0"/>
+              <a:t>DB) vs NoSQL(</a:t>
+            </a:r>
+            <a:r>
+              <a:rPr kumimoji="1" lang="ko-KR" altLang="en-US" dirty="0" err="1"/>
+              <a:t>비관계형</a:t>
+            </a:r>
+            <a:r>
+              <a:rPr kumimoji="1" lang="ko-KR" altLang="en-US" dirty="0"/>
+              <a:t> </a:t>
+            </a:r>
+            <a:r>
+              <a:rPr kumimoji="1" lang="en-US" altLang="ko-KR" dirty="0"/>
+              <a:t>DB)</a:t>
+            </a:r>
+            <a:endParaRPr kumimoji="1" lang="ko-Kore-KR" altLang="en-US" dirty="0"/>
+          </a:p>
+        </p:txBody>
+      </p:sp>
+      <p:pic>
+        <p:nvPicPr>
+          <p:cNvPr id="7" name="그림 6" descr="테이블이(가) 표시된 사진&#10;&#10;자동 생성된 설명">
+            <a:extLst>
+              <a:ext uri="{FF2B5EF4-FFF2-40B4-BE49-F238E27FC236}">
+                <a16:creationId xmlns:a16="http://schemas.microsoft.com/office/drawing/2014/main" id="{99A05701-DCE9-BD4B-AD5B-DD6F867A8D72}"/>
+              </a:ext>
+            </a:extLst>
+          </p:cNvPr>
+          <p:cNvPicPr>
+            <a:picLocks noChangeAspect="1"/>
+          </p:cNvPicPr>
+          <p:nvPr/>
+        </p:nvPicPr>
+        <p:blipFill>
+          <a:blip r:embed="rId2"/>
+          <a:stretch>
+            <a:fillRect/>
+          </a:stretch>
+        </p:blipFill>
+        <p:spPr>
+          <a:xfrm>
+            <a:off x="6096000" y="2005913"/>
+            <a:ext cx="4657640" cy="2046653"/>
+          </a:xfrm>
+          <a:prstGeom prst="rect">
+            <a:avLst/>
+          </a:prstGeom>
+        </p:spPr>
+      </p:pic>
+      <p:pic>
+        <p:nvPicPr>
+          <p:cNvPr id="9" name="그림 8" descr="테이블이(가) 표시된 사진&#10;&#10;자동 생성된 설명">
+            <a:extLst>
+              <a:ext uri="{FF2B5EF4-FFF2-40B4-BE49-F238E27FC236}">
+                <a16:creationId xmlns:a16="http://schemas.microsoft.com/office/drawing/2014/main" id="{EBF3D8F3-DD75-194F-9629-CCD23FDEB97A}"/>
+              </a:ext>
+            </a:extLst>
+          </p:cNvPr>
+          <p:cNvPicPr>
+            <a:picLocks noChangeAspect="1"/>
+          </p:cNvPicPr>
+          <p:nvPr/>
+        </p:nvPicPr>
+        <p:blipFill>
+          <a:blip r:embed="rId3"/>
+          <a:stretch>
+            <a:fillRect/>
+          </a:stretch>
+        </p:blipFill>
+        <p:spPr>
+          <a:xfrm>
+            <a:off x="1081217" y="1690687"/>
+            <a:ext cx="4318686" cy="3019569"/>
+          </a:xfrm>
+          <a:prstGeom prst="rect">
+            <a:avLst/>
+          </a:prstGeom>
+        </p:spPr>
+      </p:pic>
+      <p:sp>
+        <p:nvSpPr>
+          <p:cNvPr id="10" name="TextBox 9">
+            <a:extLst>
+              <a:ext uri="{FF2B5EF4-FFF2-40B4-BE49-F238E27FC236}">
+                <a16:creationId xmlns:a16="http://schemas.microsoft.com/office/drawing/2014/main" id="{DB71AEC1-039F-5847-83A0-757F845B7C98}"/>
+              </a:ext>
+            </a:extLst>
+          </p:cNvPr>
+          <p:cNvSpPr txBox="1"/>
+          <p:nvPr/>
+        </p:nvSpPr>
+        <p:spPr>
+          <a:xfrm>
+            <a:off x="4151870" y="5412259"/>
+            <a:ext cx="3623108" cy="369332"/>
+          </a:xfrm>
+          <a:prstGeom prst="rect">
+            <a:avLst/>
+          </a:prstGeom>
+          <a:noFill/>
+        </p:spPr>
+        <p:txBody>
+          <a:bodyPr wrap="none" rtlCol="0">
+            <a:spAutoFit/>
+          </a:bodyPr>
+          <a:lstStyle/>
+          <a:p>
+            <a:r>
+              <a:rPr kumimoji="1" lang="ko-Kore-KR" altLang="en-US" dirty="0"/>
+              <a:t>가장</a:t>
+            </a:r>
+            <a:r>
+              <a:rPr kumimoji="1" lang="ko-KR" altLang="en-US" dirty="0"/>
+              <a:t> 큰 차이 </a:t>
+            </a:r>
+            <a:r>
+              <a:rPr kumimoji="1" lang="en-US" altLang="ko-KR" dirty="0"/>
+              <a:t>:</a:t>
+            </a:r>
+            <a:r>
+              <a:rPr kumimoji="1" lang="ko-KR" altLang="en-US" dirty="0"/>
+              <a:t> </a:t>
+            </a:r>
+            <a:r>
+              <a:rPr kumimoji="1" lang="ko-Kore-KR" altLang="en-US" dirty="0"/>
+              <a:t>스키마</a:t>
+            </a:r>
+            <a:r>
+              <a:rPr kumimoji="1" lang="en-US" altLang="ko-Kore-KR" dirty="0"/>
+              <a:t>,</a:t>
+            </a:r>
+            <a:r>
+              <a:rPr kumimoji="1" lang="ko-KR" altLang="en-US" dirty="0"/>
+              <a:t> 관계의 유무</a:t>
+            </a:r>
+            <a:endParaRPr kumimoji="1" lang="ko-Kore-KR" altLang="en-US" dirty="0"/>
+          </a:p>
+        </p:txBody>
+      </p:sp>
+    </p:spTree>
+    <p:extLst>
+      <p:ext uri="{BB962C8B-B14F-4D97-AF65-F5344CB8AC3E}">
+        <p14:creationId xmlns:p14="http://schemas.microsoft.com/office/powerpoint/2010/main" val="1811834401"/>
+      </p:ext>
+    </p:extLst>
+  </p:cSld>
+  <p:clrMapOvr>
+    <a:masterClrMapping/>
+  </p:clrMapOvr>
+</p:sld>
+</file>
+
+<file path=ppt/slides/slide11.xml><?xml version="1.0" encoding="utf-8"?>
+<p:sld xmlns:a="http://schemas.openxmlformats.org/drawingml/2006/main" xmlns:r="http://schemas.openxmlformats.org/officeDocument/2006/relationships" xmlns:p="http://schemas.openxmlformats.org/presentationml/2006/main">
+  <p:cSld>
+    <p:spTree>
+      <p:nvGrpSpPr>
+        <p:cNvPr id="1" name=""/>
+        <p:cNvGrpSpPr/>
+        <p:nvPr/>
+      </p:nvGrpSpPr>
+      <p:grpSpPr>
+        <a:xfrm>
+          <a:off x="0" y="0"/>
+          <a:ext cx="0" cy="0"/>
+          <a:chOff x="0" y="0"/>
+          <a:chExt cx="0" cy="0"/>
+        </a:xfrm>
+      </p:grpSpPr>
+      <p:sp>
+        <p:nvSpPr>
+          <p:cNvPr id="2" name="제목 1">
+            <a:extLst>
+              <a:ext uri="{FF2B5EF4-FFF2-40B4-BE49-F238E27FC236}">
+                <a16:creationId xmlns:a16="http://schemas.microsoft.com/office/drawing/2014/main" id="{DACF378E-C26F-ED48-8EB9-C4197FA73038}"/>
+              </a:ext>
+            </a:extLst>
+          </p:cNvPr>
+          <p:cNvSpPr>
+            <a:spLocks noGrp="1"/>
+          </p:cNvSpPr>
+          <p:nvPr>
+            <p:ph type="title"/>
+          </p:nvPr>
+        </p:nvSpPr>
+        <p:spPr/>
+        <p:txBody>
+          <a:bodyPr/>
+          <a:lstStyle/>
+          <a:p>
+            <a:r>
+              <a:rPr lang="ko-KR" altLang="en-US" b="1" dirty="0"/>
+              <a:t>그럼 둘 중에 뭘 선택</a:t>
+            </a:r>
+            <a:r>
+              <a:rPr lang="en-US" altLang="ko-KR" b="1" dirty="0"/>
+              <a:t>?</a:t>
+            </a:r>
+            <a:br>
+              <a:rPr lang="en-US" altLang="ko-KR" b="1" dirty="0"/>
+            </a:br>
+            <a:endParaRPr kumimoji="1" lang="ko-Kore-KR" altLang="en-US" dirty="0"/>
+          </a:p>
+        </p:txBody>
+      </p:sp>
+      <p:sp>
+        <p:nvSpPr>
+          <p:cNvPr id="4" name="내용 개체 틀 3">
+            <a:extLst>
+              <a:ext uri="{FF2B5EF4-FFF2-40B4-BE49-F238E27FC236}">
+                <a16:creationId xmlns:a16="http://schemas.microsoft.com/office/drawing/2014/main" id="{2DC2142E-45AD-A64B-95F8-69EE76CF719A}"/>
+              </a:ext>
+            </a:extLst>
+          </p:cNvPr>
+          <p:cNvSpPr txBox="1">
+            <a:spLocks noGrp="1"/>
+          </p:cNvSpPr>
+          <p:nvPr>
+            <p:ph idx="1"/>
+          </p:nvPr>
+        </p:nvSpPr>
+        <p:spPr>
+          <a:xfrm>
+            <a:off x="636181" y="1230202"/>
+            <a:ext cx="11397672" cy="5828262"/>
+          </a:xfrm>
+          <a:prstGeom prst="rect">
+            <a:avLst/>
+          </a:prstGeom>
+          <a:noFill/>
+        </p:spPr>
+        <p:txBody>
+          <a:bodyPr wrap="none" rtlCol="0">
+            <a:spAutoFit/>
+          </a:bodyPr>
+          <a:lstStyle/>
+          <a:p>
+            <a:r>
+              <a:rPr lang="ko-KR" altLang="en-US" sz="1400" dirty="0"/>
+              <a:t>정답은 없다</a:t>
+            </a:r>
+            <a:r>
+              <a:rPr lang="en-US" altLang="ko-KR" sz="1400" dirty="0"/>
+              <a:t>. </a:t>
+            </a:r>
+            <a:r>
+              <a:rPr lang="ko-KR" altLang="en-US" sz="1400" dirty="0"/>
+              <a:t>둘다 훌륭한 솔루션이고 어떤 데이터를 다루느냐에 따라 선택을 고려해야한다</a:t>
+            </a:r>
+            <a:r>
+              <a:rPr lang="en-US" altLang="ko-KR" sz="1400" dirty="0"/>
+              <a:t>.</a:t>
+            </a:r>
+          </a:p>
+          <a:p>
+            <a:br>
+              <a:rPr lang="ko-KR" altLang="en-US" sz="1400" dirty="0"/>
+            </a:br>
+            <a:r>
+              <a:rPr lang="en" altLang="ko-Kore-KR" sz="1400" b="1" dirty="0"/>
+              <a:t>SQL </a:t>
+            </a:r>
+            <a:r>
+              <a:rPr lang="ko-KR" altLang="en-US" sz="1400" b="1" dirty="0"/>
+              <a:t>장점</a:t>
+            </a:r>
+          </a:p>
+          <a:p>
+            <a:r>
+              <a:rPr lang="ko-KR" altLang="en-US" sz="1400" dirty="0"/>
+              <a:t>명확하게 정의된 스키마</a:t>
+            </a:r>
+            <a:r>
+              <a:rPr lang="en-US" altLang="ko-KR" sz="1400" dirty="0"/>
+              <a:t>, </a:t>
+            </a:r>
+            <a:r>
+              <a:rPr lang="ko-KR" altLang="en-US" sz="1400" dirty="0"/>
+              <a:t>데이터 무결성 보장</a:t>
+            </a:r>
+          </a:p>
+          <a:p>
+            <a:r>
+              <a:rPr lang="ko-KR" altLang="en-US" sz="1400" dirty="0"/>
+              <a:t>관계는 각 데이터를 중복없이 한번만 저장</a:t>
+            </a:r>
+          </a:p>
+          <a:p>
+            <a:r>
+              <a:rPr lang="en" altLang="ko-Kore-KR" sz="1400" b="1" dirty="0"/>
+              <a:t>SQL </a:t>
+            </a:r>
+            <a:r>
+              <a:rPr lang="ko-KR" altLang="en-US" sz="1400" b="1" dirty="0"/>
+              <a:t>단점</a:t>
+            </a:r>
+          </a:p>
+          <a:p>
+            <a:r>
+              <a:rPr lang="ko-KR" altLang="en-US" sz="1400" dirty="0"/>
+              <a:t>덜 유연함</a:t>
+            </a:r>
+            <a:r>
+              <a:rPr lang="en-US" altLang="ko-KR" sz="1400" dirty="0"/>
+              <a:t>. </a:t>
+            </a:r>
+            <a:r>
+              <a:rPr lang="ko-KR" altLang="en-US" sz="1400" dirty="0"/>
+              <a:t>데이터 스키마를 사전에 계획하고 알려야 함</a:t>
+            </a:r>
+            <a:r>
+              <a:rPr lang="en-US" altLang="ko-KR" sz="1400" dirty="0"/>
+              <a:t>. (</a:t>
+            </a:r>
+            <a:r>
+              <a:rPr lang="ko-KR" altLang="en-US" sz="1400" dirty="0"/>
+              <a:t>나중에 수정하기 </a:t>
+            </a:r>
+            <a:r>
+              <a:rPr lang="ko-KR" altLang="en-US" sz="1400" dirty="0" err="1"/>
+              <a:t>힘듬</a:t>
+            </a:r>
+            <a:r>
+              <a:rPr lang="en-US" altLang="ko-KR" sz="1400" dirty="0"/>
+              <a:t>)</a:t>
+            </a:r>
+          </a:p>
+          <a:p>
+            <a:r>
+              <a:rPr lang="ko-KR" altLang="en-US" sz="1400" dirty="0"/>
+              <a:t>관계를 맺고 있어서 </a:t>
+            </a:r>
+            <a:r>
+              <a:rPr lang="ko-KR" altLang="en-US" sz="1400" dirty="0" err="1"/>
+              <a:t>조인문이</a:t>
+            </a:r>
+            <a:r>
+              <a:rPr lang="ko-KR" altLang="en-US" sz="1400" dirty="0"/>
+              <a:t> 많은 복잡한 쿼리가 만들어질 수 있음</a:t>
+            </a:r>
+          </a:p>
+          <a:p>
+            <a:r>
+              <a:rPr lang="ko-KR" altLang="en-US" sz="1400" dirty="0"/>
+              <a:t>대체로 수직적 </a:t>
+            </a:r>
+            <a:r>
+              <a:rPr lang="ko-KR" altLang="en-US" sz="1400" dirty="0" err="1"/>
+              <a:t>확장만</a:t>
+            </a:r>
+            <a:r>
+              <a:rPr lang="ko-KR" altLang="en-US" sz="1400" dirty="0"/>
+              <a:t> 가능함</a:t>
+            </a:r>
+          </a:p>
+          <a:p>
+            <a:br>
+              <a:rPr lang="ko-KR" altLang="en-US" sz="1400" dirty="0"/>
+            </a:br>
+            <a:r>
+              <a:rPr lang="en" altLang="ko-Kore-KR" sz="1400" b="1" dirty="0"/>
+              <a:t>NoSQL </a:t>
+            </a:r>
+            <a:r>
+              <a:rPr lang="ko-KR" altLang="en-US" sz="1400" b="1" dirty="0"/>
+              <a:t>장점</a:t>
+            </a:r>
+          </a:p>
+          <a:p>
+            <a:r>
+              <a:rPr lang="ko-KR" altLang="en-US" sz="1400" dirty="0"/>
+              <a:t>스키마가 없어서 유연함</a:t>
+            </a:r>
+            <a:r>
+              <a:rPr lang="en-US" altLang="ko-KR" sz="1400" dirty="0"/>
+              <a:t>. </a:t>
+            </a:r>
+            <a:r>
+              <a:rPr lang="ko-KR" altLang="en-US" sz="1400" dirty="0"/>
+              <a:t>언제든지 저장된 데이터를 조정하고 새로운 필드 추가 가능</a:t>
+            </a:r>
+          </a:p>
+          <a:p>
+            <a:r>
+              <a:rPr lang="ko-KR" altLang="en-US" sz="1400" dirty="0"/>
+              <a:t>데이터는 애플리케이션이 필요로 하는 형식으로 저장됨</a:t>
+            </a:r>
+            <a:r>
+              <a:rPr lang="en-US" altLang="ko-KR" sz="1400" dirty="0"/>
+              <a:t>. </a:t>
+            </a:r>
+            <a:r>
+              <a:rPr lang="ko-KR" altLang="en-US" sz="1400" dirty="0"/>
+              <a:t>데이터 읽어오는 속도 </a:t>
+            </a:r>
+            <a:r>
+              <a:rPr lang="ko-KR" altLang="en-US" sz="1400" dirty="0" err="1"/>
+              <a:t>빨라짐</a:t>
+            </a:r>
+            <a:endParaRPr lang="ko-KR" altLang="en-US" sz="1400" dirty="0"/>
+          </a:p>
+          <a:p>
+            <a:r>
+              <a:rPr lang="ko-KR" altLang="en-US" sz="1400" dirty="0"/>
+              <a:t>수직 및 수평 확장이 가능해서 애플리케이션이 발생시키는 모든 읽기</a:t>
+            </a:r>
+            <a:r>
+              <a:rPr lang="en-US" altLang="ko-KR" sz="1400" dirty="0"/>
+              <a:t>/</a:t>
+            </a:r>
+            <a:r>
+              <a:rPr lang="ko-KR" altLang="en-US" sz="1400" dirty="0"/>
+              <a:t>쓰기 요청 처리 가능</a:t>
+            </a:r>
+          </a:p>
+          <a:p>
+            <a:r>
+              <a:rPr lang="en" altLang="ko-Kore-KR" sz="1400" b="1" dirty="0"/>
+              <a:t>NoSQL </a:t>
+            </a:r>
+            <a:r>
+              <a:rPr lang="ko-KR" altLang="en-US" sz="1400" b="1" dirty="0"/>
+              <a:t>단점</a:t>
+            </a:r>
+          </a:p>
+          <a:p>
+            <a:r>
+              <a:rPr lang="ko-KR" altLang="en-US" sz="1400" dirty="0"/>
+              <a:t>유연성으로 인해 데이터 구조 결정을 미루게 될 수 있음</a:t>
+            </a:r>
+          </a:p>
+          <a:p>
+            <a:r>
+              <a:rPr lang="ko-KR" altLang="en-US" sz="1400" dirty="0"/>
+              <a:t>데이터 중복을 계속 업데이트 해야 함</a:t>
+            </a:r>
+          </a:p>
+          <a:p>
+            <a:r>
+              <a:rPr lang="ko-KR" altLang="en-US" sz="1400" dirty="0"/>
+              <a:t>데이터가 여러 컬렉션에 중복되어 있기 때문에 수정 시 모든 컬렉션에서 수행해야 함 </a:t>
+            </a:r>
+            <a:r>
+              <a:rPr lang="en-US" altLang="ko-KR" sz="1400" dirty="0"/>
+              <a:t>(</a:t>
+            </a:r>
+            <a:r>
+              <a:rPr lang="en" altLang="ko-Kore-KR" sz="1400" dirty="0"/>
+              <a:t>SQL</a:t>
+            </a:r>
+            <a:r>
+              <a:rPr lang="ko-KR" altLang="en-US" sz="1400" dirty="0"/>
+              <a:t>에서는 중복 데이터가 없으므로 한번만 수행이 가능</a:t>
+            </a:r>
+            <a:r>
+              <a:rPr lang="en-US" altLang="ko-KR" sz="1400" dirty="0"/>
+              <a:t>)</a:t>
+            </a:r>
+          </a:p>
+          <a:p>
+            <a:endParaRPr kumimoji="1" lang="ko-Kore-KR" altLang="en-US" sz="1400" dirty="0"/>
+          </a:p>
+        </p:txBody>
+      </p:sp>
+    </p:spTree>
+    <p:extLst>
+      <p:ext uri="{BB962C8B-B14F-4D97-AF65-F5344CB8AC3E}">
+        <p14:creationId xmlns:p14="http://schemas.microsoft.com/office/powerpoint/2010/main" val="2423089421"/>
+      </p:ext>
+    </p:extLst>
+  </p:cSld>
+  <p:clrMapOvr>
+    <a:masterClrMapping/>
+  </p:clrMapOvr>
+</p:sld>
+</file>
+
+<file path=ppt/slides/slide12.xml><?xml version="1.0" encoding="utf-8"?>
+<p:sld xmlns:a="http://schemas.openxmlformats.org/drawingml/2006/main" xmlns:r="http://schemas.openxmlformats.org/officeDocument/2006/relationships" xmlns:p="http://schemas.openxmlformats.org/presentationml/2006/main">
+  <p:cSld>
+    <p:spTree>
+      <p:nvGrpSpPr>
+        <p:cNvPr id="1" name=""/>
+        <p:cNvGrpSpPr/>
+        <p:nvPr/>
+      </p:nvGrpSpPr>
+      <p:grpSpPr>
+        <a:xfrm>
+          <a:off x="0" y="0"/>
+          <a:ext cx="0" cy="0"/>
+          <a:chOff x="0" y="0"/>
+          <a:chExt cx="0" cy="0"/>
+        </a:xfrm>
+      </p:grpSpPr>
+      <p:sp>
+        <p:nvSpPr>
+          <p:cNvPr id="2" name="제목 1">
+            <a:extLst>
+              <a:ext uri="{FF2B5EF4-FFF2-40B4-BE49-F238E27FC236}">
+                <a16:creationId xmlns:a16="http://schemas.microsoft.com/office/drawing/2014/main" id="{0E0EED34-5C13-5D4A-AF62-EE32F750E4D3}"/>
+              </a:ext>
+            </a:extLst>
+          </p:cNvPr>
+          <p:cNvSpPr>
+            <a:spLocks noGrp="1"/>
+          </p:cNvSpPr>
+          <p:nvPr>
+            <p:ph type="title"/>
+          </p:nvPr>
+        </p:nvSpPr>
+        <p:spPr/>
+        <p:txBody>
+          <a:bodyPr/>
+          <a:lstStyle/>
+          <a:p>
+            <a:r>
+              <a:rPr kumimoji="1" lang="en-US" altLang="ko-Kore-KR" dirty="0"/>
+              <a:t>SQL, NoSQL </a:t>
+            </a:r>
+            <a:r>
+              <a:rPr kumimoji="1" lang="ko-KR" altLang="en-US" dirty="0"/>
+              <a:t>비교</a:t>
+            </a:r>
+            <a:endParaRPr kumimoji="1" lang="ko-Kore-KR" altLang="en-US" dirty="0"/>
+          </a:p>
+        </p:txBody>
+      </p:sp>
+      <p:sp>
+        <p:nvSpPr>
+          <p:cNvPr id="7" name="TextBox 6">
+            <a:extLst>
+              <a:ext uri="{FF2B5EF4-FFF2-40B4-BE49-F238E27FC236}">
+                <a16:creationId xmlns:a16="http://schemas.microsoft.com/office/drawing/2014/main" id="{4B470EB1-9E4A-B943-8A16-D97C2C624347}"/>
+              </a:ext>
+            </a:extLst>
+          </p:cNvPr>
+          <p:cNvSpPr txBox="1"/>
+          <p:nvPr/>
+        </p:nvSpPr>
+        <p:spPr>
+          <a:xfrm>
+            <a:off x="234581" y="3718679"/>
+            <a:ext cx="6978192" cy="2462213"/>
+          </a:xfrm>
+          <a:prstGeom prst="rect">
+            <a:avLst/>
+          </a:prstGeom>
+          <a:noFill/>
+        </p:spPr>
+        <p:txBody>
+          <a:bodyPr wrap="none" rtlCol="0">
+            <a:spAutoFit/>
+          </a:bodyPr>
+          <a:lstStyle/>
+          <a:p>
+            <a:br>
+              <a:rPr lang="en" altLang="ko-Kore-KR" sz="1400" b="1" dirty="0"/>
+            </a:br>
+            <a:r>
+              <a:rPr lang="en" altLang="ko-Kore-KR" sz="1400" b="1" dirty="0"/>
+              <a:t>SQL </a:t>
+            </a:r>
+            <a:r>
+              <a:rPr lang="ko-KR" altLang="en-US" sz="1400" b="1" dirty="0"/>
+              <a:t>데이터베이스 사용이 더 좋을 때</a:t>
+            </a:r>
+          </a:p>
+          <a:p>
+            <a:r>
+              <a:rPr lang="ko-KR" altLang="en-US" sz="1400" dirty="0"/>
+              <a:t>관계를 맺고 있는 데이터가 자주 변경되는 애플리케이션의 경우</a:t>
+            </a:r>
+          </a:p>
+          <a:p>
+            <a:r>
+              <a:rPr lang="en" altLang="ko-Kore-KR" sz="1400" dirty="0"/>
+              <a:t>NoSQL</a:t>
+            </a:r>
+            <a:r>
+              <a:rPr lang="ko-KR" altLang="en-US" sz="1400" dirty="0"/>
+              <a:t>에서는 여러 컬렉션을 모두 수정해야 하기 때문에 비효율적</a:t>
+            </a:r>
+          </a:p>
+          <a:p>
+            <a:r>
+              <a:rPr lang="ko-KR" altLang="en-US" sz="1400" dirty="0"/>
+              <a:t>변경될 여지가 없고</a:t>
+            </a:r>
+            <a:r>
+              <a:rPr lang="en-US" altLang="ko-KR" sz="1400" dirty="0"/>
+              <a:t>, </a:t>
+            </a:r>
+            <a:r>
+              <a:rPr lang="ko-KR" altLang="en-US" sz="1400" dirty="0"/>
+              <a:t>명확한 스키마가 사용자와 </a:t>
+            </a:r>
+            <a:r>
+              <a:rPr lang="ko-KR" altLang="en-US" sz="1400" dirty="0" err="1"/>
+              <a:t>데이터에게</a:t>
+            </a:r>
+            <a:r>
+              <a:rPr lang="ko-KR" altLang="en-US" sz="1400" dirty="0"/>
+              <a:t> 중요한 경우</a:t>
+            </a:r>
+          </a:p>
+          <a:p>
+            <a:br>
+              <a:rPr lang="ko-KR" altLang="en-US" sz="1400" dirty="0"/>
+            </a:br>
+            <a:r>
+              <a:rPr lang="en" altLang="ko-Kore-KR" sz="1400" b="1" dirty="0"/>
+              <a:t>NoSQL </a:t>
+            </a:r>
+            <a:r>
+              <a:rPr lang="ko-KR" altLang="en-US" sz="1400" b="1" dirty="0"/>
+              <a:t>데이터베이스 사용이 더 좋을 때</a:t>
+            </a:r>
+          </a:p>
+          <a:p>
+            <a:r>
+              <a:rPr lang="ko-KR" altLang="en-US" sz="1400" dirty="0"/>
+              <a:t>정확한 데이터 구조를 알 수 없거나 변경</a:t>
+            </a:r>
+            <a:r>
+              <a:rPr lang="en-US" altLang="ko-KR" sz="1400" dirty="0"/>
+              <a:t>/</a:t>
+            </a:r>
+            <a:r>
+              <a:rPr lang="ko-KR" altLang="en-US" sz="1400" dirty="0"/>
+              <a:t>확장 될 수 있는 경우</a:t>
+            </a:r>
+          </a:p>
+          <a:p>
+            <a:r>
+              <a:rPr lang="ko-KR" altLang="en-US" sz="1400" dirty="0"/>
+              <a:t>읽기를 자주 하지만</a:t>
+            </a:r>
+            <a:r>
+              <a:rPr lang="en-US" altLang="ko-KR" sz="1400" dirty="0"/>
+              <a:t>, </a:t>
+            </a:r>
+            <a:r>
+              <a:rPr lang="ko-KR" altLang="en-US" sz="1400" dirty="0"/>
+              <a:t>데이터 변경은 자주 없는 경우</a:t>
+            </a:r>
+          </a:p>
+          <a:p>
+            <a:r>
+              <a:rPr lang="ko-KR" altLang="en-US" sz="1400" dirty="0"/>
+              <a:t>데이터베이스를 수평으로 확장해야 하는 경우 </a:t>
+            </a:r>
+            <a:r>
+              <a:rPr lang="en-US" altLang="ko-KR" sz="1400" dirty="0"/>
+              <a:t>(</a:t>
+            </a:r>
+            <a:r>
+              <a:rPr lang="ko-KR" altLang="en-US" sz="1400" dirty="0"/>
+              <a:t>막대한 양의 데이터를 다뤄야 하는 경우</a:t>
+            </a:r>
+            <a:r>
+              <a:rPr lang="en-US" altLang="ko-KR" sz="1400" dirty="0"/>
+              <a:t>)</a:t>
+            </a:r>
+          </a:p>
+          <a:p>
+            <a:endParaRPr kumimoji="1" lang="ko-Kore-KR" altLang="en-US" sz="1400" dirty="0"/>
+          </a:p>
+        </p:txBody>
+      </p:sp>
+      <p:graphicFrame>
+        <p:nvGraphicFramePr>
+          <p:cNvPr id="10" name="내용 개체 틀 9">
+            <a:extLst>
+              <a:ext uri="{FF2B5EF4-FFF2-40B4-BE49-F238E27FC236}">
+                <a16:creationId xmlns:a16="http://schemas.microsoft.com/office/drawing/2014/main" id="{E662D4E1-EFE9-794D-9B3E-9AFA72C8AFF5}"/>
+              </a:ext>
+            </a:extLst>
+          </p:cNvPr>
+          <p:cNvGraphicFramePr>
+            <a:graphicFrameLocks noGrp="1"/>
+          </p:cNvGraphicFramePr>
+          <p:nvPr>
+            <p:ph idx="1"/>
+            <p:extLst>
+              <p:ext uri="{D42A27DB-BD31-4B8C-83A1-F6EECF244321}">
+                <p14:modId xmlns:p14="http://schemas.microsoft.com/office/powerpoint/2010/main" val="2128190453"/>
+              </p:ext>
+            </p:extLst>
+          </p:nvPr>
+        </p:nvGraphicFramePr>
+        <p:xfrm>
+          <a:off x="5924367" y="250835"/>
+          <a:ext cx="6033052" cy="4401936"/>
+        </p:xfrm>
+        <a:graphic>
+          <a:graphicData uri="http://schemas.openxmlformats.org/drawingml/2006/table">
+            <a:tbl>
+              <a:tblPr/>
+              <a:tblGrid>
+                <a:gridCol w="3016526">
+                  <a:extLst>
+                    <a:ext uri="{9D8B030D-6E8A-4147-A177-3AD203B41FA5}">
+                      <a16:colId xmlns:a16="http://schemas.microsoft.com/office/drawing/2014/main" val="3311589121"/>
+                    </a:ext>
+                  </a:extLst>
+                </a:gridCol>
+                <a:gridCol w="3016526">
+                  <a:extLst>
+                    <a:ext uri="{9D8B030D-6E8A-4147-A177-3AD203B41FA5}">
+                      <a16:colId xmlns:a16="http://schemas.microsoft.com/office/drawing/2014/main" val="3104695682"/>
+                    </a:ext>
+                  </a:extLst>
+                </a:gridCol>
+              </a:tblGrid>
+              <a:tr h="218520">
+                <a:tc>
+                  <a:txBody>
+                    <a:bodyPr/>
+                    <a:lstStyle/>
+                    <a:p>
+                      <a:pPr fontAlgn="t"/>
+                      <a:r>
+                        <a:rPr lang="en" sz="1400" b="1">
+                          <a:effectLst/>
+                        </a:rPr>
+                        <a:t>SQL</a:t>
+                      </a:r>
+                      <a:endParaRPr lang="en" sz="1400">
+                        <a:effectLst/>
+                      </a:endParaRPr>
+                    </a:p>
+                  </a:txBody>
+                  <a:tcPr marL="70183" marR="70183" marT="35091" marB="35091">
+                    <a:lnL w="9525" cap="flat" cmpd="sng" algn="ctr">
+                      <a:solidFill>
+                        <a:srgbClr val="E4E9F0"/>
+                      </a:solidFill>
+                      <a:prstDash val="solid"/>
+                      <a:round/>
+                      <a:headEnd type="none" w="med" len="med"/>
+                      <a:tailEnd type="none" w="med" len="med"/>
+                    </a:lnL>
+                    <a:lnR w="9525" cap="flat" cmpd="sng" algn="ctr">
+                      <a:solidFill>
+                        <a:srgbClr val="E4E9F0"/>
+                      </a:solidFill>
+                      <a:prstDash val="solid"/>
+                      <a:round/>
+                      <a:headEnd type="none" w="med" len="med"/>
+                      <a:tailEnd type="none" w="med" len="med"/>
+                    </a:lnR>
+                    <a:lnT>
+                      <a:noFill/>
+                    </a:lnT>
+                    <a:lnB w="9525" cap="flat" cmpd="sng" algn="ctr">
+                      <a:solidFill>
+                        <a:srgbClr val="E4E9F0"/>
+                      </a:solidFill>
+                      <a:prstDash val="solid"/>
+                      <a:round/>
+                      <a:headEnd type="none" w="med" len="med"/>
+                      <a:tailEnd type="none" w="med" len="med"/>
+                    </a:lnB>
+                  </a:tcPr>
+                </a:tc>
+                <a:tc>
+                  <a:txBody>
+                    <a:bodyPr/>
+                    <a:lstStyle/>
+                    <a:p>
+                      <a:pPr fontAlgn="t"/>
+                      <a:r>
+                        <a:rPr lang="en" sz="1400" b="1" dirty="0">
+                          <a:effectLst/>
+                        </a:rPr>
+                        <a:t>NoSQL</a:t>
+                      </a:r>
+                      <a:endParaRPr lang="en" sz="1400" dirty="0">
+                        <a:effectLst/>
+                      </a:endParaRPr>
+                    </a:p>
+                  </a:txBody>
+                  <a:tcPr marL="70183" marR="70183" marT="35091" marB="35091">
+                    <a:lnL w="9525" cap="flat" cmpd="sng" algn="ctr">
+                      <a:solidFill>
+                        <a:srgbClr val="E4E9F0"/>
+                      </a:solidFill>
+                      <a:prstDash val="solid"/>
+                      <a:round/>
+                      <a:headEnd type="none" w="med" len="med"/>
+                      <a:tailEnd type="none" w="med" len="med"/>
+                    </a:lnL>
+                    <a:lnR w="9525" cap="flat" cmpd="sng" algn="ctr">
+                      <a:solidFill>
+                        <a:srgbClr val="E4E9F0"/>
+                      </a:solidFill>
+                      <a:prstDash val="solid"/>
+                      <a:round/>
+                      <a:headEnd type="none" w="med" len="med"/>
+                      <a:tailEnd type="none" w="med" len="med"/>
+                    </a:lnR>
+                    <a:lnT>
+                      <a:noFill/>
+                    </a:lnT>
+                    <a:lnB w="9525" cap="flat" cmpd="sng" algn="ctr">
+                      <a:solidFill>
+                        <a:srgbClr val="E4E9F0"/>
+                      </a:solidFill>
+                      <a:prstDash val="solid"/>
+                      <a:round/>
+                      <a:headEnd type="none" w="med" len="med"/>
+                      <a:tailEnd type="none" w="med" len="med"/>
+                    </a:lnB>
+                  </a:tcPr>
+                </a:tc>
+                <a:extLst>
+                  <a:ext uri="{0D108BD9-81ED-4DB2-BD59-A6C34878D82A}">
+                    <a16:rowId xmlns:a16="http://schemas.microsoft.com/office/drawing/2014/main" val="3560832952"/>
+                  </a:ext>
+                </a:extLst>
+              </a:tr>
+              <a:tr h="382952">
+                <a:tc>
+                  <a:txBody>
+                    <a:bodyPr/>
+                    <a:lstStyle/>
+                    <a:p>
+                      <a:pPr fontAlgn="t"/>
+                      <a:r>
+                        <a:rPr lang="ko-KR" altLang="en-US" sz="1400">
+                          <a:effectLst/>
+                        </a:rPr>
+                        <a:t>관계형 데이터베이스 관리 시스템</a:t>
+                      </a:r>
+                      <a:br>
+                        <a:rPr lang="ko-KR" altLang="en-US" sz="1400">
+                          <a:effectLst/>
+                        </a:rPr>
+                      </a:br>
+                      <a:endParaRPr lang="ko-KR" altLang="en-US" sz="1400">
+                        <a:effectLst/>
+                      </a:endParaRPr>
+                    </a:p>
+                  </a:txBody>
+                  <a:tcPr marL="70183" marR="70183" marT="35091" marB="35091">
+                    <a:lnL w="9525" cap="flat" cmpd="sng" algn="ctr">
+                      <a:solidFill>
+                        <a:srgbClr val="E4E9F0"/>
+                      </a:solidFill>
+                      <a:prstDash val="solid"/>
+                      <a:round/>
+                      <a:headEnd type="none" w="med" len="med"/>
+                      <a:tailEnd type="none" w="med" len="med"/>
+                    </a:lnL>
+                    <a:lnR w="9525" cap="flat" cmpd="sng" algn="ctr">
+                      <a:solidFill>
+                        <a:srgbClr val="E4E9F0"/>
+                      </a:solidFill>
+                      <a:prstDash val="solid"/>
+                      <a:round/>
+                      <a:headEnd type="none" w="med" len="med"/>
+                      <a:tailEnd type="none" w="med" len="med"/>
+                    </a:lnR>
+                    <a:lnT w="9525" cap="flat" cmpd="sng" algn="ctr">
+                      <a:solidFill>
+                        <a:srgbClr val="E4E9F0"/>
+                      </a:solidFill>
+                      <a:prstDash val="solid"/>
+                      <a:round/>
+                      <a:headEnd type="none" w="med" len="med"/>
+                      <a:tailEnd type="none" w="med" len="med"/>
+                    </a:lnT>
+                    <a:lnB w="9525" cap="flat" cmpd="sng" algn="ctr">
+                      <a:solidFill>
+                        <a:srgbClr val="E4E9F0"/>
+                      </a:solidFill>
+                      <a:prstDash val="solid"/>
+                      <a:round/>
+                      <a:headEnd type="none" w="med" len="med"/>
+                      <a:tailEnd type="none" w="med" len="med"/>
+                    </a:lnB>
+                  </a:tcPr>
+                </a:tc>
+                <a:tc>
+                  <a:txBody>
+                    <a:bodyPr/>
+                    <a:lstStyle/>
+                    <a:p>
+                      <a:pPr fontAlgn="t"/>
+                      <a:r>
+                        <a:rPr lang="ko-KR" altLang="en-US" sz="1400">
+                          <a:effectLst/>
+                        </a:rPr>
+                        <a:t>분산형 데이터베이스 관리 시스템</a:t>
+                      </a:r>
+                      <a:br>
+                        <a:rPr lang="ko-KR" altLang="en-US" sz="1400">
+                          <a:effectLst/>
+                        </a:rPr>
+                      </a:br>
+                      <a:endParaRPr lang="ko-KR" altLang="en-US" sz="1400">
+                        <a:effectLst/>
+                      </a:endParaRPr>
+                    </a:p>
+                  </a:txBody>
+                  <a:tcPr marL="70183" marR="70183" marT="35091" marB="35091">
+                    <a:lnL w="9525" cap="flat" cmpd="sng" algn="ctr">
+                      <a:solidFill>
+                        <a:srgbClr val="E4E9F0"/>
+                      </a:solidFill>
+                      <a:prstDash val="solid"/>
+                      <a:round/>
+                      <a:headEnd type="none" w="med" len="med"/>
+                      <a:tailEnd type="none" w="med" len="med"/>
+                    </a:lnL>
+                    <a:lnR w="9525" cap="flat" cmpd="sng" algn="ctr">
+                      <a:solidFill>
+                        <a:srgbClr val="E4E9F0"/>
+                      </a:solidFill>
+                      <a:prstDash val="solid"/>
+                      <a:round/>
+                      <a:headEnd type="none" w="med" len="med"/>
+                      <a:tailEnd type="none" w="med" len="med"/>
+                    </a:lnR>
+                    <a:lnT w="9525" cap="flat" cmpd="sng" algn="ctr">
+                      <a:solidFill>
+                        <a:srgbClr val="E4E9F0"/>
+                      </a:solidFill>
+                      <a:prstDash val="solid"/>
+                      <a:round/>
+                      <a:headEnd type="none" w="med" len="med"/>
+                      <a:tailEnd type="none" w="med" len="med"/>
+                    </a:lnT>
+                    <a:lnB w="9525" cap="flat" cmpd="sng" algn="ctr">
+                      <a:solidFill>
+                        <a:srgbClr val="E4E9F0"/>
+                      </a:solidFill>
+                      <a:prstDash val="solid"/>
+                      <a:round/>
+                      <a:headEnd type="none" w="med" len="med"/>
+                      <a:tailEnd type="none" w="med" len="med"/>
+                    </a:lnB>
+                  </a:tcPr>
+                </a:tc>
+                <a:extLst>
+                  <a:ext uri="{0D108BD9-81ED-4DB2-BD59-A6C34878D82A}">
+                    <a16:rowId xmlns:a16="http://schemas.microsoft.com/office/drawing/2014/main" val="16475172"/>
+                  </a:ext>
+                </a:extLst>
+              </a:tr>
+              <a:tr h="382952">
+                <a:tc>
+                  <a:txBody>
+                    <a:bodyPr/>
+                    <a:lstStyle/>
+                    <a:p>
+                      <a:pPr fontAlgn="t"/>
+                      <a:r>
+                        <a:rPr lang="ko-KR" altLang="en-US" sz="1400">
+                          <a:effectLst/>
+                        </a:rPr>
+                        <a:t>수직적 확장</a:t>
+                      </a:r>
+                      <a:br>
+                        <a:rPr lang="ko-KR" altLang="en-US" sz="1400">
+                          <a:effectLst/>
+                        </a:rPr>
+                      </a:br>
+                      <a:endParaRPr lang="ko-KR" altLang="en-US" sz="1400">
+                        <a:effectLst/>
+                      </a:endParaRPr>
+                    </a:p>
+                  </a:txBody>
+                  <a:tcPr marL="70183" marR="70183" marT="35091" marB="35091">
+                    <a:lnL w="9525" cap="flat" cmpd="sng" algn="ctr">
+                      <a:solidFill>
+                        <a:srgbClr val="E4E9F0"/>
+                      </a:solidFill>
+                      <a:prstDash val="solid"/>
+                      <a:round/>
+                      <a:headEnd type="none" w="med" len="med"/>
+                      <a:tailEnd type="none" w="med" len="med"/>
+                    </a:lnL>
+                    <a:lnR w="9525" cap="flat" cmpd="sng" algn="ctr">
+                      <a:solidFill>
+                        <a:srgbClr val="E4E9F0"/>
+                      </a:solidFill>
+                      <a:prstDash val="solid"/>
+                      <a:round/>
+                      <a:headEnd type="none" w="med" len="med"/>
+                      <a:tailEnd type="none" w="med" len="med"/>
+                    </a:lnR>
+                    <a:lnT w="9525" cap="flat" cmpd="sng" algn="ctr">
+                      <a:solidFill>
+                        <a:srgbClr val="E4E9F0"/>
+                      </a:solidFill>
+                      <a:prstDash val="solid"/>
+                      <a:round/>
+                      <a:headEnd type="none" w="med" len="med"/>
+                      <a:tailEnd type="none" w="med" len="med"/>
+                    </a:lnT>
+                    <a:lnB w="9525" cap="flat" cmpd="sng" algn="ctr">
+                      <a:solidFill>
+                        <a:srgbClr val="E4E9F0"/>
+                      </a:solidFill>
+                      <a:prstDash val="solid"/>
+                      <a:round/>
+                      <a:headEnd type="none" w="med" len="med"/>
+                      <a:tailEnd type="none" w="med" len="med"/>
+                    </a:lnB>
+                  </a:tcPr>
+                </a:tc>
+                <a:tc>
+                  <a:txBody>
+                    <a:bodyPr/>
+                    <a:lstStyle/>
+                    <a:p>
+                      <a:pPr fontAlgn="t"/>
+                      <a:r>
+                        <a:rPr lang="ko-KR" altLang="en-US" sz="1400">
+                          <a:effectLst/>
+                        </a:rPr>
+                        <a:t>수평적 확장</a:t>
+                      </a:r>
+                      <a:br>
+                        <a:rPr lang="ko-KR" altLang="en-US" sz="1400">
+                          <a:effectLst/>
+                        </a:rPr>
+                      </a:br>
+                      <a:endParaRPr lang="ko-KR" altLang="en-US" sz="1400">
+                        <a:effectLst/>
+                      </a:endParaRPr>
+                    </a:p>
+                  </a:txBody>
+                  <a:tcPr marL="70183" marR="70183" marT="35091" marB="35091">
+                    <a:lnL w="9525" cap="flat" cmpd="sng" algn="ctr">
+                      <a:solidFill>
+                        <a:srgbClr val="E4E9F0"/>
+                      </a:solidFill>
+                      <a:prstDash val="solid"/>
+                      <a:round/>
+                      <a:headEnd type="none" w="med" len="med"/>
+                      <a:tailEnd type="none" w="med" len="med"/>
+                    </a:lnL>
+                    <a:lnR w="9525" cap="flat" cmpd="sng" algn="ctr">
+                      <a:solidFill>
+                        <a:srgbClr val="E4E9F0"/>
+                      </a:solidFill>
+                      <a:prstDash val="solid"/>
+                      <a:round/>
+                      <a:headEnd type="none" w="med" len="med"/>
+                      <a:tailEnd type="none" w="med" len="med"/>
+                    </a:lnR>
+                    <a:lnT w="9525" cap="flat" cmpd="sng" algn="ctr">
+                      <a:solidFill>
+                        <a:srgbClr val="E4E9F0"/>
+                      </a:solidFill>
+                      <a:prstDash val="solid"/>
+                      <a:round/>
+                      <a:headEnd type="none" w="med" len="med"/>
+                      <a:tailEnd type="none" w="med" len="med"/>
+                    </a:lnT>
+                    <a:lnB w="9525" cap="flat" cmpd="sng" algn="ctr">
+                      <a:solidFill>
+                        <a:srgbClr val="E4E9F0"/>
+                      </a:solidFill>
+                      <a:prstDash val="solid"/>
+                      <a:round/>
+                      <a:headEnd type="none" w="med" len="med"/>
+                      <a:tailEnd type="none" w="med" len="med"/>
+                    </a:lnB>
+                  </a:tcPr>
+                </a:tc>
+                <a:extLst>
+                  <a:ext uri="{0D108BD9-81ED-4DB2-BD59-A6C34878D82A}">
+                    <a16:rowId xmlns:a16="http://schemas.microsoft.com/office/drawing/2014/main" val="924548397"/>
+                  </a:ext>
+                </a:extLst>
+              </a:tr>
+              <a:tr h="382952">
+                <a:tc>
+                  <a:txBody>
+                    <a:bodyPr/>
+                    <a:lstStyle/>
+                    <a:p>
+                      <a:pPr fontAlgn="t"/>
+                      <a:r>
+                        <a:rPr lang="ko-KR" altLang="en-US" sz="1400">
+                          <a:effectLst/>
+                        </a:rPr>
+                        <a:t>스키마에 의해 선정의 되어 있음</a:t>
+                      </a:r>
+                      <a:br>
+                        <a:rPr lang="ko-KR" altLang="en-US" sz="1400">
+                          <a:effectLst/>
+                        </a:rPr>
+                      </a:br>
+                      <a:endParaRPr lang="ko-KR" altLang="en-US" sz="1400">
+                        <a:effectLst/>
+                      </a:endParaRPr>
+                    </a:p>
+                  </a:txBody>
+                  <a:tcPr marL="70183" marR="70183" marT="35091" marB="35091">
+                    <a:lnL w="9525" cap="flat" cmpd="sng" algn="ctr">
+                      <a:solidFill>
+                        <a:srgbClr val="E4E9F0"/>
+                      </a:solidFill>
+                      <a:prstDash val="solid"/>
+                      <a:round/>
+                      <a:headEnd type="none" w="med" len="med"/>
+                      <a:tailEnd type="none" w="med" len="med"/>
+                    </a:lnL>
+                    <a:lnR w="9525" cap="flat" cmpd="sng" algn="ctr">
+                      <a:solidFill>
+                        <a:srgbClr val="E4E9F0"/>
+                      </a:solidFill>
+                      <a:prstDash val="solid"/>
+                      <a:round/>
+                      <a:headEnd type="none" w="med" len="med"/>
+                      <a:tailEnd type="none" w="med" len="med"/>
+                    </a:lnR>
+                    <a:lnT w="9525" cap="flat" cmpd="sng" algn="ctr">
+                      <a:solidFill>
+                        <a:srgbClr val="E4E9F0"/>
+                      </a:solidFill>
+                      <a:prstDash val="solid"/>
+                      <a:round/>
+                      <a:headEnd type="none" w="med" len="med"/>
+                      <a:tailEnd type="none" w="med" len="med"/>
+                    </a:lnT>
+                    <a:lnB w="9525" cap="flat" cmpd="sng" algn="ctr">
+                      <a:solidFill>
+                        <a:srgbClr val="E4E9F0"/>
+                      </a:solidFill>
+                      <a:prstDash val="solid"/>
+                      <a:round/>
+                      <a:headEnd type="none" w="med" len="med"/>
+                      <a:tailEnd type="none" w="med" len="med"/>
+                    </a:lnB>
+                  </a:tcPr>
+                </a:tc>
+                <a:tc>
+                  <a:txBody>
+                    <a:bodyPr/>
+                    <a:lstStyle/>
+                    <a:p>
+                      <a:pPr fontAlgn="t"/>
+                      <a:r>
+                        <a:rPr lang="ko-KR" altLang="en-US" sz="1400">
+                          <a:effectLst/>
+                        </a:rPr>
+                        <a:t>스키마가 없거나 다이나믹함</a:t>
+                      </a:r>
+                      <a:r>
+                        <a:rPr lang="en-US" altLang="ko-KR" sz="1400">
+                          <a:effectLst/>
+                        </a:rPr>
+                        <a:t>(</a:t>
+                      </a:r>
+                      <a:r>
+                        <a:rPr lang="ko-KR" altLang="en-US" sz="1400">
+                          <a:effectLst/>
+                        </a:rPr>
+                        <a:t>유연함</a:t>
+                      </a:r>
+                      <a:r>
+                        <a:rPr lang="en-US" altLang="ko-KR" sz="1400">
+                          <a:effectLst/>
+                        </a:rPr>
+                        <a:t>)</a:t>
+                      </a:r>
+                      <a:br>
+                        <a:rPr lang="en-US" altLang="ko-KR" sz="1400">
+                          <a:effectLst/>
+                        </a:rPr>
+                      </a:br>
+                      <a:endParaRPr lang="en-US" altLang="ko-KR" sz="1400">
+                        <a:effectLst/>
+                      </a:endParaRPr>
+                    </a:p>
+                  </a:txBody>
+                  <a:tcPr marL="70183" marR="70183" marT="35091" marB="35091">
+                    <a:lnL w="9525" cap="flat" cmpd="sng" algn="ctr">
+                      <a:solidFill>
+                        <a:srgbClr val="E4E9F0"/>
+                      </a:solidFill>
+                      <a:prstDash val="solid"/>
+                      <a:round/>
+                      <a:headEnd type="none" w="med" len="med"/>
+                      <a:tailEnd type="none" w="med" len="med"/>
+                    </a:lnL>
+                    <a:lnR w="9525" cap="flat" cmpd="sng" algn="ctr">
+                      <a:solidFill>
+                        <a:srgbClr val="E4E9F0"/>
+                      </a:solidFill>
+                      <a:prstDash val="solid"/>
+                      <a:round/>
+                      <a:headEnd type="none" w="med" len="med"/>
+                      <a:tailEnd type="none" w="med" len="med"/>
+                    </a:lnR>
+                    <a:lnT w="9525" cap="flat" cmpd="sng" algn="ctr">
+                      <a:solidFill>
+                        <a:srgbClr val="E4E9F0"/>
+                      </a:solidFill>
+                      <a:prstDash val="solid"/>
+                      <a:round/>
+                      <a:headEnd type="none" w="med" len="med"/>
+                      <a:tailEnd type="none" w="med" len="med"/>
+                    </a:lnT>
+                    <a:lnB w="9525" cap="flat" cmpd="sng" algn="ctr">
+                      <a:solidFill>
+                        <a:srgbClr val="E4E9F0"/>
+                      </a:solidFill>
+                      <a:prstDash val="solid"/>
+                      <a:round/>
+                      <a:headEnd type="none" w="med" len="med"/>
+                      <a:tailEnd type="none" w="med" len="med"/>
+                    </a:lnB>
+                  </a:tcPr>
+                </a:tc>
+                <a:extLst>
+                  <a:ext uri="{0D108BD9-81ED-4DB2-BD59-A6C34878D82A}">
+                    <a16:rowId xmlns:a16="http://schemas.microsoft.com/office/drawing/2014/main" val="2174978298"/>
+                  </a:ext>
+                </a:extLst>
+              </a:tr>
+              <a:tr h="547384">
+                <a:tc>
+                  <a:txBody>
+                    <a:bodyPr/>
+                    <a:lstStyle/>
+                    <a:p>
+                      <a:pPr fontAlgn="t"/>
+                      <a:r>
+                        <a:rPr lang="ko-KR" altLang="en-US" sz="1400">
+                          <a:effectLst/>
+                        </a:rPr>
+                        <a:t>견고하고 단단함</a:t>
+                      </a:r>
+                      <a:r>
+                        <a:rPr lang="en-US" altLang="ko-KR" sz="1400">
+                          <a:effectLst/>
+                        </a:rPr>
+                        <a:t>! </a:t>
+                      </a:r>
+                      <a:r>
+                        <a:rPr lang="ko-KR" altLang="en-US" sz="1400">
+                          <a:effectLst/>
+                        </a:rPr>
+                        <a:t>부하를 잘 견딤</a:t>
+                      </a:r>
+                      <a:br>
+                        <a:rPr lang="ko-KR" altLang="en-US" sz="1400">
+                          <a:effectLst/>
+                        </a:rPr>
+                      </a:br>
+                      <a:endParaRPr lang="ko-KR" altLang="en-US" sz="1400">
+                        <a:effectLst/>
+                      </a:endParaRPr>
+                    </a:p>
+                  </a:txBody>
+                  <a:tcPr marL="70183" marR="70183" marT="35091" marB="35091">
+                    <a:lnL w="9525" cap="flat" cmpd="sng" algn="ctr">
+                      <a:solidFill>
+                        <a:srgbClr val="E4E9F0"/>
+                      </a:solidFill>
+                      <a:prstDash val="solid"/>
+                      <a:round/>
+                      <a:headEnd type="none" w="med" len="med"/>
+                      <a:tailEnd type="none" w="med" len="med"/>
+                    </a:lnL>
+                    <a:lnR w="9525" cap="flat" cmpd="sng" algn="ctr">
+                      <a:solidFill>
+                        <a:srgbClr val="E4E9F0"/>
+                      </a:solidFill>
+                      <a:prstDash val="solid"/>
+                      <a:round/>
+                      <a:headEnd type="none" w="med" len="med"/>
+                      <a:tailEnd type="none" w="med" len="med"/>
+                    </a:lnR>
+                    <a:lnT w="9525" cap="flat" cmpd="sng" algn="ctr">
+                      <a:solidFill>
+                        <a:srgbClr val="E4E9F0"/>
+                      </a:solidFill>
+                      <a:prstDash val="solid"/>
+                      <a:round/>
+                      <a:headEnd type="none" w="med" len="med"/>
+                      <a:tailEnd type="none" w="med" len="med"/>
+                    </a:lnT>
+                    <a:lnB w="9525" cap="flat" cmpd="sng" algn="ctr">
+                      <a:solidFill>
+                        <a:srgbClr val="E4E9F0"/>
+                      </a:solidFill>
+                      <a:prstDash val="solid"/>
+                      <a:round/>
+                      <a:headEnd type="none" w="med" len="med"/>
+                      <a:tailEnd type="none" w="med" len="med"/>
+                    </a:lnB>
+                  </a:tcPr>
+                </a:tc>
+                <a:tc>
+                  <a:txBody>
+                    <a:bodyPr/>
+                    <a:lstStyle/>
+                    <a:p>
+                      <a:pPr fontAlgn="t"/>
+                      <a:r>
+                        <a:rPr lang="en" sz="1400">
+                          <a:effectLst/>
+                        </a:rPr>
+                        <a:t>SQL</a:t>
+                      </a:r>
+                      <a:r>
+                        <a:rPr lang="ko-KR" altLang="en-US" sz="1400">
+                          <a:effectLst/>
+                        </a:rPr>
+                        <a:t>보다 일반적으로 빠른 경향이 있음</a:t>
+                      </a:r>
+                      <a:br>
+                        <a:rPr lang="ko-KR" altLang="en-US" sz="1400">
+                          <a:effectLst/>
+                        </a:rPr>
+                      </a:br>
+                      <a:endParaRPr lang="ko-KR" altLang="en-US" sz="1400">
+                        <a:effectLst/>
+                      </a:endParaRPr>
+                    </a:p>
+                  </a:txBody>
+                  <a:tcPr marL="70183" marR="70183" marT="35091" marB="35091">
+                    <a:lnL w="9525" cap="flat" cmpd="sng" algn="ctr">
+                      <a:solidFill>
+                        <a:srgbClr val="E4E9F0"/>
+                      </a:solidFill>
+                      <a:prstDash val="solid"/>
+                      <a:round/>
+                      <a:headEnd type="none" w="med" len="med"/>
+                      <a:tailEnd type="none" w="med" len="med"/>
+                    </a:lnL>
+                    <a:lnR w="9525" cap="flat" cmpd="sng" algn="ctr">
+                      <a:solidFill>
+                        <a:srgbClr val="E4E9F0"/>
+                      </a:solidFill>
+                      <a:prstDash val="solid"/>
+                      <a:round/>
+                      <a:headEnd type="none" w="med" len="med"/>
+                      <a:tailEnd type="none" w="med" len="med"/>
+                    </a:lnR>
+                    <a:lnT w="9525" cap="flat" cmpd="sng" algn="ctr">
+                      <a:solidFill>
+                        <a:srgbClr val="E4E9F0"/>
+                      </a:solidFill>
+                      <a:prstDash val="solid"/>
+                      <a:round/>
+                      <a:headEnd type="none" w="med" len="med"/>
+                      <a:tailEnd type="none" w="med" len="med"/>
+                    </a:lnT>
+                    <a:lnB w="9525" cap="flat" cmpd="sng" algn="ctr">
+                      <a:solidFill>
+                        <a:srgbClr val="E4E9F0"/>
+                      </a:solidFill>
+                      <a:prstDash val="solid"/>
+                      <a:round/>
+                      <a:headEnd type="none" w="med" len="med"/>
+                      <a:tailEnd type="none" w="med" len="med"/>
+                    </a:lnB>
+                  </a:tcPr>
+                </a:tc>
+                <a:extLst>
+                  <a:ext uri="{0D108BD9-81ED-4DB2-BD59-A6C34878D82A}">
+                    <a16:rowId xmlns:a16="http://schemas.microsoft.com/office/drawing/2014/main" val="1740397159"/>
+                  </a:ext>
+                </a:extLst>
+              </a:tr>
+              <a:tr h="547384">
+                <a:tc>
+                  <a:txBody>
+                    <a:bodyPr/>
+                    <a:lstStyle/>
+                    <a:p>
+                      <a:pPr fontAlgn="t"/>
+                      <a:r>
+                        <a:rPr lang="ko-KR" altLang="en-US" sz="1400">
+                          <a:effectLst/>
+                        </a:rPr>
+                        <a:t>역사가 깊은만큼 설치</a:t>
+                      </a:r>
+                      <a:r>
+                        <a:rPr lang="en-US" altLang="ko-KR" sz="1400">
+                          <a:effectLst/>
+                        </a:rPr>
+                        <a:t>/</a:t>
+                      </a:r>
+                      <a:r>
+                        <a:rPr lang="ko-KR" altLang="en-US" sz="1400">
+                          <a:effectLst/>
+                        </a:rPr>
+                        <a:t>설정이 쉬워 시간이 절약됨</a:t>
+                      </a:r>
+                      <a:br>
+                        <a:rPr lang="ko-KR" altLang="en-US" sz="1400">
+                          <a:effectLst/>
+                        </a:rPr>
+                      </a:br>
+                      <a:endParaRPr lang="ko-KR" altLang="en-US" sz="1400">
+                        <a:effectLst/>
+                      </a:endParaRPr>
+                    </a:p>
+                  </a:txBody>
+                  <a:tcPr marL="70183" marR="70183" marT="35091" marB="35091">
+                    <a:lnL w="9525" cap="flat" cmpd="sng" algn="ctr">
+                      <a:solidFill>
+                        <a:srgbClr val="E4E9F0"/>
+                      </a:solidFill>
+                      <a:prstDash val="solid"/>
+                      <a:round/>
+                      <a:headEnd type="none" w="med" len="med"/>
+                      <a:tailEnd type="none" w="med" len="med"/>
+                    </a:lnL>
+                    <a:lnR w="9525" cap="flat" cmpd="sng" algn="ctr">
+                      <a:solidFill>
+                        <a:srgbClr val="E4E9F0"/>
+                      </a:solidFill>
+                      <a:prstDash val="solid"/>
+                      <a:round/>
+                      <a:headEnd type="none" w="med" len="med"/>
+                      <a:tailEnd type="none" w="med" len="med"/>
+                    </a:lnR>
+                    <a:lnT w="9525" cap="flat" cmpd="sng" algn="ctr">
+                      <a:solidFill>
+                        <a:srgbClr val="E4E9F0"/>
+                      </a:solidFill>
+                      <a:prstDash val="solid"/>
+                      <a:round/>
+                      <a:headEnd type="none" w="med" len="med"/>
+                      <a:tailEnd type="none" w="med" len="med"/>
+                    </a:lnT>
+                    <a:lnB w="9525" cap="flat" cmpd="sng" algn="ctr">
+                      <a:solidFill>
+                        <a:srgbClr val="E4E9F0"/>
+                      </a:solidFill>
+                      <a:prstDash val="solid"/>
+                      <a:round/>
+                      <a:headEnd type="none" w="med" len="med"/>
+                      <a:tailEnd type="none" w="med" len="med"/>
+                    </a:lnB>
+                  </a:tcPr>
+                </a:tc>
+                <a:tc>
+                  <a:txBody>
+                    <a:bodyPr/>
+                    <a:lstStyle/>
+                    <a:p>
+                      <a:pPr fontAlgn="t"/>
+                      <a:r>
+                        <a:rPr lang="ko-KR" altLang="en-US" sz="1400">
+                          <a:effectLst/>
+                        </a:rPr>
+                        <a:t>처음 모델링 자체가 요구되지 않아서 시간이 절약됨</a:t>
+                      </a:r>
+                      <a:br>
+                        <a:rPr lang="ko-KR" altLang="en-US" sz="1400">
+                          <a:effectLst/>
+                        </a:rPr>
+                      </a:br>
+                      <a:endParaRPr lang="ko-KR" altLang="en-US" sz="1400">
+                        <a:effectLst/>
+                      </a:endParaRPr>
+                    </a:p>
+                  </a:txBody>
+                  <a:tcPr marL="70183" marR="70183" marT="35091" marB="35091">
+                    <a:lnL w="9525" cap="flat" cmpd="sng" algn="ctr">
+                      <a:solidFill>
+                        <a:srgbClr val="E4E9F0"/>
+                      </a:solidFill>
+                      <a:prstDash val="solid"/>
+                      <a:round/>
+                      <a:headEnd type="none" w="med" len="med"/>
+                      <a:tailEnd type="none" w="med" len="med"/>
+                    </a:lnL>
+                    <a:lnR w="9525" cap="flat" cmpd="sng" algn="ctr">
+                      <a:solidFill>
+                        <a:srgbClr val="E4E9F0"/>
+                      </a:solidFill>
+                      <a:prstDash val="solid"/>
+                      <a:round/>
+                      <a:headEnd type="none" w="med" len="med"/>
+                      <a:tailEnd type="none" w="med" len="med"/>
+                    </a:lnR>
+                    <a:lnT w="9525" cap="flat" cmpd="sng" algn="ctr">
+                      <a:solidFill>
+                        <a:srgbClr val="E4E9F0"/>
+                      </a:solidFill>
+                      <a:prstDash val="solid"/>
+                      <a:round/>
+                      <a:headEnd type="none" w="med" len="med"/>
+                      <a:tailEnd type="none" w="med" len="med"/>
+                    </a:lnT>
+                    <a:lnB w="9525" cap="flat" cmpd="sng" algn="ctr">
+                      <a:solidFill>
+                        <a:srgbClr val="E4E9F0"/>
+                      </a:solidFill>
+                      <a:prstDash val="solid"/>
+                      <a:round/>
+                      <a:headEnd type="none" w="med" len="med"/>
+                      <a:tailEnd type="none" w="med" len="med"/>
+                    </a:lnB>
+                  </a:tcPr>
+                </a:tc>
+                <a:extLst>
+                  <a:ext uri="{0D108BD9-81ED-4DB2-BD59-A6C34878D82A}">
+                    <a16:rowId xmlns:a16="http://schemas.microsoft.com/office/drawing/2014/main" val="3004804398"/>
+                  </a:ext>
+                </a:extLst>
+              </a:tr>
+              <a:tr h="382952">
+                <a:tc>
+                  <a:txBody>
+                    <a:bodyPr/>
+                    <a:lstStyle/>
+                    <a:p>
+                      <a:pPr fontAlgn="t"/>
+                      <a:r>
+                        <a:rPr lang="ko-KR" altLang="en-US" sz="1400">
+                          <a:effectLst/>
+                        </a:rPr>
+                        <a:t>꾸준한 속도를 보여줌</a:t>
+                      </a:r>
+                      <a:br>
+                        <a:rPr lang="ko-KR" altLang="en-US" sz="1400">
+                          <a:effectLst/>
+                        </a:rPr>
+                      </a:br>
+                      <a:endParaRPr lang="ko-KR" altLang="en-US" sz="1400">
+                        <a:effectLst/>
+                      </a:endParaRPr>
+                    </a:p>
+                  </a:txBody>
+                  <a:tcPr marL="70183" marR="70183" marT="35091" marB="35091">
+                    <a:lnL w="9525" cap="flat" cmpd="sng" algn="ctr">
+                      <a:solidFill>
+                        <a:srgbClr val="E4E9F0"/>
+                      </a:solidFill>
+                      <a:prstDash val="solid"/>
+                      <a:round/>
+                      <a:headEnd type="none" w="med" len="med"/>
+                      <a:tailEnd type="none" w="med" len="med"/>
+                    </a:lnL>
+                    <a:lnR w="9525" cap="flat" cmpd="sng" algn="ctr">
+                      <a:solidFill>
+                        <a:srgbClr val="E4E9F0"/>
+                      </a:solidFill>
+                      <a:prstDash val="solid"/>
+                      <a:round/>
+                      <a:headEnd type="none" w="med" len="med"/>
+                      <a:tailEnd type="none" w="med" len="med"/>
+                    </a:lnR>
+                    <a:lnT w="9525" cap="flat" cmpd="sng" algn="ctr">
+                      <a:solidFill>
+                        <a:srgbClr val="E4E9F0"/>
+                      </a:solidFill>
+                      <a:prstDash val="solid"/>
+                      <a:round/>
+                      <a:headEnd type="none" w="med" len="med"/>
+                      <a:tailEnd type="none" w="med" len="med"/>
+                    </a:lnT>
+                    <a:lnB w="9525" cap="flat" cmpd="sng" algn="ctr">
+                      <a:solidFill>
+                        <a:srgbClr val="E4E9F0"/>
+                      </a:solidFill>
+                      <a:prstDash val="solid"/>
+                      <a:round/>
+                      <a:headEnd type="none" w="med" len="med"/>
+                      <a:tailEnd type="none" w="med" len="med"/>
+                    </a:lnB>
+                  </a:tcPr>
+                </a:tc>
+                <a:tc>
+                  <a:txBody>
+                    <a:bodyPr/>
+                    <a:lstStyle/>
+                    <a:p>
+                      <a:pPr fontAlgn="t"/>
+                      <a:r>
+                        <a:rPr lang="ko-KR" altLang="en-US" sz="1400">
+                          <a:effectLst/>
+                        </a:rPr>
+                        <a:t>때때로 응답속도가 느릴 수 있음</a:t>
+                      </a:r>
+                      <a:br>
+                        <a:rPr lang="ko-KR" altLang="en-US" sz="1400">
+                          <a:effectLst/>
+                        </a:rPr>
+                      </a:br>
+                      <a:endParaRPr lang="ko-KR" altLang="en-US" sz="1400">
+                        <a:effectLst/>
+                      </a:endParaRPr>
+                    </a:p>
+                  </a:txBody>
+                  <a:tcPr marL="70183" marR="70183" marT="35091" marB="35091">
+                    <a:lnL w="9525" cap="flat" cmpd="sng" algn="ctr">
+                      <a:solidFill>
+                        <a:srgbClr val="E4E9F0"/>
+                      </a:solidFill>
+                      <a:prstDash val="solid"/>
+                      <a:round/>
+                      <a:headEnd type="none" w="med" len="med"/>
+                      <a:tailEnd type="none" w="med" len="med"/>
+                    </a:lnL>
+                    <a:lnR w="9525" cap="flat" cmpd="sng" algn="ctr">
+                      <a:solidFill>
+                        <a:srgbClr val="E4E9F0"/>
+                      </a:solidFill>
+                      <a:prstDash val="solid"/>
+                      <a:round/>
+                      <a:headEnd type="none" w="med" len="med"/>
+                      <a:tailEnd type="none" w="med" len="med"/>
+                    </a:lnR>
+                    <a:lnT w="9525" cap="flat" cmpd="sng" algn="ctr">
+                      <a:solidFill>
+                        <a:srgbClr val="E4E9F0"/>
+                      </a:solidFill>
+                      <a:prstDash val="solid"/>
+                      <a:round/>
+                      <a:headEnd type="none" w="med" len="med"/>
+                      <a:tailEnd type="none" w="med" len="med"/>
+                    </a:lnT>
+                    <a:lnB w="9525" cap="flat" cmpd="sng" algn="ctr">
+                      <a:solidFill>
+                        <a:srgbClr val="E4E9F0"/>
+                      </a:solidFill>
+                      <a:prstDash val="solid"/>
+                      <a:round/>
+                      <a:headEnd type="none" w="med" len="med"/>
+                      <a:tailEnd type="none" w="med" len="med"/>
+                    </a:lnB>
+                  </a:tcPr>
+                </a:tc>
+                <a:extLst>
+                  <a:ext uri="{0D108BD9-81ED-4DB2-BD59-A6C34878D82A}">
+                    <a16:rowId xmlns:a16="http://schemas.microsoft.com/office/drawing/2014/main" val="450451068"/>
+                  </a:ext>
+                </a:extLst>
+              </a:tr>
+              <a:tr h="547384">
+                <a:tc>
+                  <a:txBody>
+                    <a:bodyPr/>
+                    <a:lstStyle/>
+                    <a:p>
+                      <a:pPr fontAlgn="t"/>
+                      <a:r>
+                        <a:rPr lang="ko-KR" altLang="en-US" sz="1400">
+                          <a:effectLst/>
+                        </a:rPr>
+                        <a:t>여러 테이블을 조인하는 등 복잡한 쿼리 사용가능</a:t>
+                      </a:r>
+                      <a:br>
+                        <a:rPr lang="ko-KR" altLang="en-US" sz="1400">
+                          <a:effectLst/>
+                        </a:rPr>
+                      </a:br>
+                      <a:endParaRPr lang="ko-KR" altLang="en-US" sz="1400">
+                        <a:effectLst/>
+                      </a:endParaRPr>
+                    </a:p>
+                  </a:txBody>
+                  <a:tcPr marL="70183" marR="70183" marT="35091" marB="35091">
+                    <a:lnL w="9525" cap="flat" cmpd="sng" algn="ctr">
+                      <a:solidFill>
+                        <a:srgbClr val="E4E9F0"/>
+                      </a:solidFill>
+                      <a:prstDash val="solid"/>
+                      <a:round/>
+                      <a:headEnd type="none" w="med" len="med"/>
+                      <a:tailEnd type="none" w="med" len="med"/>
+                    </a:lnL>
+                    <a:lnR w="9525" cap="flat" cmpd="sng" algn="ctr">
+                      <a:solidFill>
+                        <a:srgbClr val="E4E9F0"/>
+                      </a:solidFill>
+                      <a:prstDash val="solid"/>
+                      <a:round/>
+                      <a:headEnd type="none" w="med" len="med"/>
+                      <a:tailEnd type="none" w="med" len="med"/>
+                    </a:lnR>
+                    <a:lnT w="9525" cap="flat" cmpd="sng" algn="ctr">
+                      <a:solidFill>
+                        <a:srgbClr val="E4E9F0"/>
+                      </a:solidFill>
+                      <a:prstDash val="solid"/>
+                      <a:round/>
+                      <a:headEnd type="none" w="med" len="med"/>
+                      <a:tailEnd type="none" w="med" len="med"/>
+                    </a:lnT>
+                    <a:lnB w="9525" cap="flat" cmpd="sng" algn="ctr">
+                      <a:solidFill>
+                        <a:srgbClr val="E4E9F0"/>
+                      </a:solidFill>
+                      <a:prstDash val="solid"/>
+                      <a:round/>
+                      <a:headEnd type="none" w="med" len="med"/>
+                      <a:tailEnd type="none" w="med" len="med"/>
+                    </a:lnB>
+                  </a:tcPr>
+                </a:tc>
+                <a:tc>
+                  <a:txBody>
+                    <a:bodyPr/>
+                    <a:lstStyle/>
+                    <a:p>
+                      <a:pPr fontAlgn="t"/>
+                      <a:r>
+                        <a:rPr lang="ko-KR" altLang="en-US" sz="1400" dirty="0" err="1">
+                          <a:effectLst/>
+                        </a:rPr>
+                        <a:t>테이블간</a:t>
+                      </a:r>
+                      <a:r>
+                        <a:rPr lang="ko-KR" altLang="en-US" sz="1400" dirty="0">
+                          <a:effectLst/>
+                        </a:rPr>
+                        <a:t> 관계가 </a:t>
+                      </a:r>
+                      <a:r>
+                        <a:rPr lang="ko-KR" altLang="en-US" sz="1400" dirty="0" err="1">
+                          <a:effectLst/>
+                        </a:rPr>
+                        <a:t>없어복잡한</a:t>
+                      </a:r>
+                      <a:r>
+                        <a:rPr lang="ko-KR" altLang="en-US" sz="1400" dirty="0">
+                          <a:effectLst/>
+                        </a:rPr>
+                        <a:t> </a:t>
+                      </a:r>
+                      <a:r>
+                        <a:rPr lang="ko-KR" altLang="en-US" sz="1400" dirty="0" err="1">
+                          <a:effectLst/>
+                        </a:rPr>
+                        <a:t>쿼리사용이</a:t>
+                      </a:r>
+                      <a:r>
+                        <a:rPr lang="ko-KR" altLang="en-US" sz="1400" dirty="0">
+                          <a:effectLst/>
+                        </a:rPr>
+                        <a:t> 부적합함</a:t>
+                      </a:r>
+                    </a:p>
+                  </a:txBody>
+                  <a:tcPr marL="70183" marR="70183" marT="35091" marB="35091">
+                    <a:lnL w="9525" cap="flat" cmpd="sng" algn="ctr">
+                      <a:solidFill>
+                        <a:srgbClr val="E4E9F0"/>
+                      </a:solidFill>
+                      <a:prstDash val="solid"/>
+                      <a:round/>
+                      <a:headEnd type="none" w="med" len="med"/>
+                      <a:tailEnd type="none" w="med" len="med"/>
+                    </a:lnL>
+                    <a:lnR w="9525" cap="flat" cmpd="sng" algn="ctr">
+                      <a:solidFill>
+                        <a:srgbClr val="E4E9F0"/>
+                      </a:solidFill>
+                      <a:prstDash val="solid"/>
+                      <a:round/>
+                      <a:headEnd type="none" w="med" len="med"/>
+                      <a:tailEnd type="none" w="med" len="med"/>
+                    </a:lnR>
+                    <a:lnT w="9525" cap="flat" cmpd="sng" algn="ctr">
+                      <a:solidFill>
+                        <a:srgbClr val="E4E9F0"/>
+                      </a:solidFill>
+                      <a:prstDash val="solid"/>
+                      <a:round/>
+                      <a:headEnd type="none" w="med" len="med"/>
+                      <a:tailEnd type="none" w="med" len="med"/>
+                    </a:lnT>
+                    <a:lnB w="9525" cap="flat" cmpd="sng" algn="ctr">
+                      <a:solidFill>
+                        <a:srgbClr val="E4E9F0"/>
+                      </a:solidFill>
+                      <a:prstDash val="solid"/>
+                      <a:round/>
+                      <a:headEnd type="none" w="med" len="med"/>
+                      <a:tailEnd type="none" w="med" len="med"/>
+                    </a:lnB>
+                  </a:tcPr>
+                </a:tc>
+                <a:extLst>
+                  <a:ext uri="{0D108BD9-81ED-4DB2-BD59-A6C34878D82A}">
+                    <a16:rowId xmlns:a16="http://schemas.microsoft.com/office/drawing/2014/main" val="2444974031"/>
+                  </a:ext>
+                </a:extLst>
+              </a:tr>
+            </a:tbl>
+          </a:graphicData>
+        </a:graphic>
+      </p:graphicFrame>
+    </p:spTree>
+    <p:extLst>
+      <p:ext uri="{BB962C8B-B14F-4D97-AF65-F5344CB8AC3E}">
+        <p14:creationId xmlns:p14="http://schemas.microsoft.com/office/powerpoint/2010/main" val="2680933947"/>
+      </p:ext>
+    </p:extLst>
+  </p:cSld>
+  <p:clrMapOvr>
+    <a:masterClrMapping/>
+  </p:clrMapOvr>
+</p:sld>
+</file>
+
+<file path=ppt/slides/slide13.xml><?xml version="1.0" encoding="utf-8"?>
+<p:sld xmlns:a="http://schemas.openxmlformats.org/drawingml/2006/main" xmlns:r="http://schemas.openxmlformats.org/officeDocument/2006/relationships" xmlns:p="http://schemas.openxmlformats.org/presentationml/2006/main">
+  <p:cSld>
+    <p:spTree>
+      <p:nvGrpSpPr>
+        <p:cNvPr id="1" name=""/>
+        <p:cNvGrpSpPr/>
+        <p:nvPr/>
+      </p:nvGrpSpPr>
+      <p:grpSpPr>
+        <a:xfrm>
+          <a:off x="0" y="0"/>
+          <a:ext cx="0" cy="0"/>
+          <a:chOff x="0" y="0"/>
+          <a:chExt cx="0" cy="0"/>
+        </a:xfrm>
+      </p:grpSpPr>
+      <p:sp>
+        <p:nvSpPr>
+          <p:cNvPr id="2" name="제목 1">
+            <a:extLst>
+              <a:ext uri="{FF2B5EF4-FFF2-40B4-BE49-F238E27FC236}">
+                <a16:creationId xmlns:a16="http://schemas.microsoft.com/office/drawing/2014/main" id="{BAAE6BBC-39C1-4C45-A7B1-41668EF732F7}"/>
+              </a:ext>
+            </a:extLst>
+          </p:cNvPr>
+          <p:cNvSpPr>
+            <a:spLocks noGrp="1"/>
+          </p:cNvSpPr>
+          <p:nvPr>
+            <p:ph type="title"/>
+          </p:nvPr>
+        </p:nvSpPr>
+        <p:spPr/>
+        <p:txBody>
+          <a:bodyPr/>
+          <a:lstStyle/>
+          <a:p>
+            <a:r>
+              <a:rPr kumimoji="1" lang="en-US" altLang="ko-Kore-KR" dirty="0"/>
+              <a:t>reference</a:t>
+            </a:r>
+            <a:endParaRPr kumimoji="1" lang="ko-Kore-KR" altLang="en-US" dirty="0"/>
+          </a:p>
+        </p:txBody>
+      </p:sp>
+      <p:sp>
+        <p:nvSpPr>
+          <p:cNvPr id="4" name="TextBox 3">
+            <a:extLst>
+              <a:ext uri="{FF2B5EF4-FFF2-40B4-BE49-F238E27FC236}">
+                <a16:creationId xmlns:a16="http://schemas.microsoft.com/office/drawing/2014/main" id="{1EA78D8C-86A1-D74D-AB98-A84F1A1DCB45}"/>
+              </a:ext>
+            </a:extLst>
+          </p:cNvPr>
+          <p:cNvSpPr txBox="1"/>
+          <p:nvPr/>
+        </p:nvSpPr>
+        <p:spPr>
+          <a:xfrm>
+            <a:off x="483476" y="2274838"/>
+            <a:ext cx="9895466" cy="2862322"/>
+          </a:xfrm>
+          <a:prstGeom prst="rect">
+            <a:avLst/>
+          </a:prstGeom>
+          <a:noFill/>
+        </p:spPr>
+        <p:txBody>
+          <a:bodyPr wrap="none" rtlCol="0">
+            <a:spAutoFit/>
+          </a:bodyPr>
+          <a:lstStyle/>
+          <a:p>
+            <a:r>
+              <a:rPr kumimoji="1" lang="en" altLang="ko-Kore-KR" dirty="0">
+                <a:hlinkClick r:id="rId2"/>
+              </a:rPr>
+              <a:t>https://mjmjmj98.tistory.com/43</a:t>
+            </a:r>
+            <a:endParaRPr kumimoji="1" lang="en" altLang="ko-Kore-KR" dirty="0"/>
+          </a:p>
+          <a:p>
+            <a:endParaRPr kumimoji="1" lang="en" altLang="ko-Kore-KR" dirty="0"/>
+          </a:p>
+          <a:p>
+            <a:r>
+              <a:rPr kumimoji="1" lang="en" altLang="ko-Kore-KR" dirty="0">
+                <a:hlinkClick r:id="rId3"/>
+              </a:rPr>
+              <a:t>https://github.com/JaeYeopHan/Interview_Question_for_Beginner/tree/master/Database</a:t>
+            </a:r>
+            <a:endParaRPr kumimoji="1" lang="en" altLang="ko-Kore-KR" dirty="0"/>
+          </a:p>
+          <a:p>
+            <a:endParaRPr kumimoji="1" lang="en-US" altLang="ko-Kore-KR" dirty="0"/>
+          </a:p>
+          <a:p>
+            <a:r>
+              <a:rPr kumimoji="1" lang="en" altLang="ko-Kore-KR" dirty="0">
+                <a:hlinkClick r:id="rId4"/>
+              </a:rPr>
+              <a:t>https://github.com/gyoogle/tech-interview-for-developer/tree/master/Computer%20Science/Database</a:t>
+            </a:r>
+            <a:endParaRPr kumimoji="1" lang="en" altLang="ko-Kore-KR" dirty="0"/>
+          </a:p>
+          <a:p>
+            <a:endParaRPr kumimoji="1" lang="en" altLang="ko-Kore-KR" dirty="0"/>
+          </a:p>
+          <a:p>
+            <a:r>
+              <a:rPr kumimoji="1" lang="en" altLang="ko-Kore-KR" dirty="0">
+                <a:hlinkClick r:id="rId5"/>
+              </a:rPr>
+              <a:t>https://blog.naver.com/sjs2018/222471823096</a:t>
+            </a:r>
+            <a:endParaRPr kumimoji="1" lang="en" altLang="ko-Kore-KR" dirty="0"/>
+          </a:p>
+          <a:p>
+            <a:endParaRPr kumimoji="1" lang="en-US" altLang="ko-Kore-KR" dirty="0"/>
+          </a:p>
+          <a:p>
+            <a:r>
+              <a:rPr kumimoji="1" lang="ko-KR" altLang="en-US" dirty="0"/>
+              <a:t>스키마 </a:t>
+            </a:r>
+            <a:r>
+              <a:rPr kumimoji="1" lang="en-US" altLang="ko-KR" dirty="0"/>
+              <a:t>:</a:t>
+            </a:r>
+            <a:r>
+              <a:rPr kumimoji="1" lang="ko-KR" altLang="en-US" dirty="0"/>
+              <a:t> </a:t>
+            </a:r>
+            <a:r>
+              <a:rPr kumimoji="1" lang="en" altLang="ko-KR" dirty="0"/>
+              <a:t>https://</a:t>
+            </a:r>
+            <a:r>
+              <a:rPr kumimoji="1" lang="en" altLang="ko-KR" dirty="0" err="1"/>
+              <a:t>jwprogramming.tistory.com</a:t>
+            </a:r>
+            <a:r>
+              <a:rPr kumimoji="1" lang="en" altLang="ko-KR" dirty="0"/>
+              <a:t>/47</a:t>
+            </a:r>
+            <a:endParaRPr kumimoji="1" lang="en" altLang="ko-Kore-KR" dirty="0"/>
+          </a:p>
+          <a:p>
+            <a:endParaRPr kumimoji="1" lang="ko-Kore-KR" altLang="en-US" dirty="0"/>
+          </a:p>
+        </p:txBody>
+      </p:sp>
+    </p:spTree>
+    <p:extLst>
+      <p:ext uri="{BB962C8B-B14F-4D97-AF65-F5344CB8AC3E}">
+        <p14:creationId xmlns:p14="http://schemas.microsoft.com/office/powerpoint/2010/main" val="183795028"/>
+      </p:ext>
+    </p:extLst>
+  </p:cSld>
+  <p:clrMapOvr>
+    <a:masterClrMapping/>
+  </p:clrMapOvr>
+</p:sld>
+</file>
+
 <file path=ppt/slides/slide2.xml><?xml version="1.0" encoding="utf-8"?>
 <p:sld xmlns:a="http://schemas.openxmlformats.org/drawingml/2006/main" xmlns:r="http://schemas.openxmlformats.org/officeDocument/2006/relationships" xmlns:p="http://schemas.openxmlformats.org/presentationml/2006/main">
   <p:cSld>
@@ -4115,8 +6227,6 @@
               <a:rPr lang="en-US" altLang="ko-KR" dirty="0"/>
               <a:t>.</a:t>
             </a:r>
-          </a:p>
-          <a:p>
             <a:br>
               <a:rPr lang="ko-KR" altLang="en-US" dirty="0"/>
             </a:br>
@@ -4515,6 +6625,62 @@
           </a:p>
         </p:txBody>
       </p:sp>
+      <p:sp>
+        <p:nvSpPr>
+          <p:cNvPr id="6" name="TextBox 5">
+            <a:extLst>
+              <a:ext uri="{FF2B5EF4-FFF2-40B4-BE49-F238E27FC236}">
+                <a16:creationId xmlns:a16="http://schemas.microsoft.com/office/drawing/2014/main" id="{F8DEFC7D-360A-CC4E-B9B1-B68C03383A41}"/>
+              </a:ext>
+            </a:extLst>
+          </p:cNvPr>
+          <p:cNvSpPr txBox="1"/>
+          <p:nvPr/>
+        </p:nvSpPr>
+        <p:spPr>
+          <a:xfrm>
+            <a:off x="1733107" y="6092326"/>
+            <a:ext cx="2590774" cy="369332"/>
+          </a:xfrm>
+          <a:prstGeom prst="rect">
+            <a:avLst/>
+          </a:prstGeom>
+          <a:noFill/>
+        </p:spPr>
+        <p:txBody>
+          <a:bodyPr wrap="none" rtlCol="0">
+            <a:spAutoFit/>
+          </a:bodyPr>
+          <a:lstStyle/>
+          <a:p>
+            <a:r>
+              <a:rPr kumimoji="1" lang="ko-Kore-KR" altLang="en-US" dirty="0"/>
+              <a:t>위</a:t>
+            </a:r>
+            <a:r>
+              <a:rPr kumimoji="1" lang="ko-KR" altLang="en-US" dirty="0"/>
+              <a:t> </a:t>
+            </a:r>
+            <a:r>
+              <a:rPr kumimoji="1" lang="en-US" altLang="ko-KR" dirty="0"/>
+              <a:t>2</a:t>
+            </a:r>
+            <a:r>
+              <a:rPr kumimoji="1" lang="ko-KR" altLang="en-US" dirty="0"/>
+              <a:t>개가 </a:t>
+            </a:r>
+            <a:r>
+              <a:rPr kumimoji="1" lang="ko-Kore-KR" altLang="en-US" dirty="0"/>
+              <a:t>가장</a:t>
+            </a:r>
+            <a:r>
+              <a:rPr kumimoji="1" lang="ko-KR" altLang="en-US" dirty="0"/>
+              <a:t> 많이 쓰임</a:t>
+            </a:r>
+            <a:endParaRPr kumimoji="1" lang="ko-Kore-KR" altLang="en-US" dirty="0"/>
+          </a:p>
+        </p:txBody>
+      </p:sp>
     </p:spTree>
     <p:extLst>
       <p:ext uri="{BB962C8B-B14F-4D97-AF65-F5344CB8AC3E}">
@@ -4683,109 +6849,376 @@
           <a:lstStyle/>
           <a:p>
             <a:r>
-              <a:rPr kumimoji="1" lang="en-US" altLang="ko-Kore-KR" dirty="0"/>
-              <a:t>SQL(</a:t>
-            </a:r>
-            <a:r>
-              <a:rPr kumimoji="1" lang="ko-KR" altLang="en-US" dirty="0"/>
-              <a:t>관계형 </a:t>
-            </a:r>
-            <a:r>
-              <a:rPr kumimoji="1" lang="en-US" altLang="ko-KR" dirty="0"/>
-              <a:t>DB) vs NoSQL(</a:t>
-            </a:r>
-            <a:r>
               <a:rPr kumimoji="1" lang="ko-KR" altLang="en-US" dirty="0" err="1"/>
-              <a:t>비관계형</a:t>
-            </a:r>
-            <a:r>
-              <a:rPr kumimoji="1" lang="ko-KR" altLang="en-US" dirty="0"/>
-              <a:t> </a:t>
-            </a:r>
-            <a:r>
-              <a:rPr kumimoji="1" lang="en-US" altLang="ko-KR" dirty="0"/>
-              <a:t>DB)</a:t>
+              <a:t>스키마란</a:t>
             </a:r>
             <a:endParaRPr kumimoji="1" lang="ko-Kore-KR" altLang="en-US" dirty="0"/>
           </a:p>
         </p:txBody>
       </p:sp>
-      <p:pic>
-        <p:nvPicPr>
-          <p:cNvPr id="7" name="그림 6" descr="테이블이(가) 표시된 사진&#10;&#10;자동 생성된 설명">
-            <a:extLst>
-              <a:ext uri="{FF2B5EF4-FFF2-40B4-BE49-F238E27FC236}">
-                <a16:creationId xmlns:a16="http://schemas.microsoft.com/office/drawing/2014/main" id="{99A05701-DCE9-BD4B-AD5B-DD6F867A8D72}"/>
-              </a:ext>
-            </a:extLst>
-          </p:cNvPr>
-          <p:cNvPicPr>
-            <a:picLocks noChangeAspect="1"/>
-          </p:cNvPicPr>
+      <p:sp>
+        <p:nvSpPr>
+          <p:cNvPr id="3" name="직사각형 2">
+            <a:extLst>
+              <a:ext uri="{FF2B5EF4-FFF2-40B4-BE49-F238E27FC236}">
+                <a16:creationId xmlns:a16="http://schemas.microsoft.com/office/drawing/2014/main" id="{217CA5FA-375C-7E43-A3BE-8045E969FC5A}"/>
+              </a:ext>
+            </a:extLst>
+          </p:cNvPr>
+          <p:cNvSpPr/>
           <p:nvPr/>
-        </p:nvPicPr>
-        <p:blipFill>
-          <a:blip r:embed="rId2"/>
-          <a:stretch>
-            <a:fillRect/>
-          </a:stretch>
-        </p:blipFill>
+        </p:nvSpPr>
         <p:spPr>
           <a:xfrm>
-            <a:off x="6096000" y="2005913"/>
-            <a:ext cx="4657640" cy="2046653"/>
+            <a:off x="453390" y="1560820"/>
+            <a:ext cx="6096000" cy="2308324"/>
           </a:xfrm>
           <a:prstGeom prst="rect">
             <a:avLst/>
           </a:prstGeom>
         </p:spPr>
-      </p:pic>
-      <p:pic>
-        <p:nvPicPr>
-          <p:cNvPr id="9" name="그림 8" descr="테이블이(가) 표시된 사진&#10;&#10;자동 생성된 설명">
-            <a:extLst>
-              <a:ext uri="{FF2B5EF4-FFF2-40B4-BE49-F238E27FC236}">
-                <a16:creationId xmlns:a16="http://schemas.microsoft.com/office/drawing/2014/main" id="{EBF3D8F3-DD75-194F-9629-CCD23FDEB97A}"/>
-              </a:ext>
-            </a:extLst>
-          </p:cNvPr>
-          <p:cNvPicPr>
-            <a:picLocks noChangeAspect="1"/>
-          </p:cNvPicPr>
+        <p:txBody>
+          <a:bodyPr>
+            <a:spAutoFit/>
+          </a:bodyPr>
+          <a:lstStyle/>
+          <a:p>
+            <a:r>
+              <a:rPr lang="ko-KR" altLang="en-US" b="1" dirty="0" err="1">
+                <a:solidFill>
+                  <a:srgbClr val="333333"/>
+                </a:solidFill>
+                <a:latin typeface="맑은 고딕" panose="020B0503020000020004" pitchFamily="34" charset="-127"/>
+              </a:rPr>
+              <a:t>스키마</a:t>
+            </a:r>
+            <a:r>
+              <a:rPr lang="ko-KR" altLang="en-US" dirty="0" err="1">
+                <a:solidFill>
+                  <a:srgbClr val="333333"/>
+                </a:solidFill>
+                <a:latin typeface="맑은 고딕" panose="020B0503020000020004" pitchFamily="34" charset="-127"/>
+              </a:rPr>
+              <a:t>란</a:t>
+            </a:r>
+            <a:r>
+              <a:rPr lang="ko-KR" altLang="en-US" dirty="0">
+                <a:solidFill>
+                  <a:srgbClr val="333333"/>
+                </a:solidFill>
+                <a:latin typeface="맑은 고딕" panose="020B0503020000020004" pitchFamily="34" charset="-127"/>
+              </a:rPr>
+              <a:t> </a:t>
+            </a:r>
+            <a:r>
+              <a:rPr lang="en-US" altLang="ko-KR" dirty="0">
+                <a:solidFill>
+                  <a:srgbClr val="333333"/>
+                </a:solidFill>
+                <a:latin typeface="맑은 고딕" panose="020B0503020000020004" pitchFamily="34" charset="-127"/>
+              </a:rPr>
+              <a:t>-</a:t>
+            </a:r>
+            <a:r>
+              <a:rPr lang="ko-KR" altLang="en-US" b="1" dirty="0">
+                <a:solidFill>
+                  <a:srgbClr val="333333"/>
+                </a:solidFill>
+                <a:latin typeface="맑은 고딕" panose="020B0503020000020004" pitchFamily="34" charset="-127"/>
+              </a:rPr>
+              <a:t> </a:t>
+            </a:r>
+            <a:r>
+              <a:rPr lang="ko-KR" altLang="en-US" dirty="0">
+                <a:solidFill>
+                  <a:srgbClr val="FF0000"/>
+                </a:solidFill>
+                <a:latin typeface="맑은 고딕" panose="020B0503020000020004" pitchFamily="34" charset="-127"/>
+              </a:rPr>
+              <a:t>데이터베이스의 구조와 제약조건에 관해 전반적인 명세를 기술한 것</a:t>
+            </a:r>
+            <a:endParaRPr lang="ko-KR" altLang="en-US" dirty="0">
+              <a:solidFill>
+                <a:srgbClr val="333333"/>
+              </a:solidFill>
+              <a:latin typeface="Source Sans Pro" panose="020B0503030403020204" pitchFamily="34" charset="0"/>
+            </a:endParaRPr>
+          </a:p>
+          <a:p>
+            <a:r>
+              <a:rPr lang="ko-KR" altLang="en-US" dirty="0">
+                <a:solidFill>
+                  <a:srgbClr val="333333"/>
+                </a:solidFill>
+                <a:latin typeface="맑은 고딕" panose="020B0503020000020004" pitchFamily="34" charset="-127"/>
+              </a:rPr>
+              <a:t>개체의 특성을 나타내는 </a:t>
+            </a:r>
+            <a:r>
+              <a:rPr lang="ko-KR" altLang="en-US" dirty="0">
+                <a:solidFill>
+                  <a:srgbClr val="FF0000"/>
+                </a:solidFill>
+                <a:latin typeface="맑은 고딕" panose="020B0503020000020004" pitchFamily="34" charset="-127"/>
+              </a:rPr>
+              <a:t>속성</a:t>
+            </a:r>
+            <a:r>
+              <a:rPr lang="en-US" altLang="ko-KR" dirty="0">
+                <a:solidFill>
+                  <a:srgbClr val="FF0000"/>
+                </a:solidFill>
+                <a:latin typeface="맑은 고딕" panose="020B0503020000020004" pitchFamily="34" charset="-127"/>
+              </a:rPr>
+              <a:t>(</a:t>
+            </a:r>
+            <a:r>
+              <a:rPr lang="en" altLang="ko-Kore-KR" dirty="0">
+                <a:solidFill>
+                  <a:srgbClr val="FF0000"/>
+                </a:solidFill>
+                <a:latin typeface="맑은 고딕" panose="020B0503020000020004" pitchFamily="34" charset="-127"/>
+                <a:ea typeface="맑은 고딕" panose="020B0503020000020004" pitchFamily="34" charset="-127"/>
+              </a:rPr>
+              <a:t>Attribute)</a:t>
+            </a:r>
+            <a:r>
+              <a:rPr lang="ko-KR" altLang="en-US" dirty="0">
+                <a:solidFill>
+                  <a:srgbClr val="333333"/>
+                </a:solidFill>
+                <a:latin typeface="맑은 고딕" panose="020B0503020000020004" pitchFamily="34" charset="-127"/>
+              </a:rPr>
+              <a:t>과 </a:t>
+            </a:r>
+            <a:endParaRPr lang="ko-KR" altLang="en-US" dirty="0">
+              <a:solidFill>
+                <a:srgbClr val="333333"/>
+              </a:solidFill>
+              <a:latin typeface="Source Sans Pro" panose="020B0503030403020204" pitchFamily="34" charset="0"/>
+            </a:endParaRPr>
+          </a:p>
+          <a:p>
+            <a:r>
+              <a:rPr lang="ko-KR" altLang="en-US" dirty="0">
+                <a:solidFill>
+                  <a:srgbClr val="333333"/>
+                </a:solidFill>
+                <a:latin typeface="맑은 고딕" panose="020B0503020000020004" pitchFamily="34" charset="-127"/>
+              </a:rPr>
+              <a:t>속성들의 집합으로 이루어진 </a:t>
+            </a:r>
+            <a:r>
+              <a:rPr lang="ko-KR" altLang="en-US" dirty="0">
+                <a:solidFill>
+                  <a:srgbClr val="FF0000"/>
+                </a:solidFill>
+                <a:latin typeface="맑은 고딕" panose="020B0503020000020004" pitchFamily="34" charset="-127"/>
+              </a:rPr>
+              <a:t>개체</a:t>
+            </a:r>
+            <a:r>
+              <a:rPr lang="en-US" altLang="ko-KR" dirty="0">
+                <a:solidFill>
+                  <a:srgbClr val="FF0000"/>
+                </a:solidFill>
+                <a:latin typeface="맑은 고딕" panose="020B0503020000020004" pitchFamily="34" charset="-127"/>
+              </a:rPr>
+              <a:t>(</a:t>
+            </a:r>
+            <a:r>
+              <a:rPr lang="en" altLang="ko-Kore-KR" dirty="0">
+                <a:solidFill>
+                  <a:srgbClr val="FF0000"/>
+                </a:solidFill>
+                <a:latin typeface="맑은 고딕" panose="020B0503020000020004" pitchFamily="34" charset="-127"/>
+                <a:ea typeface="맑은 고딕" panose="020B0503020000020004" pitchFamily="34" charset="-127"/>
+              </a:rPr>
+              <a:t>Entity)</a:t>
+            </a:r>
+            <a:r>
+              <a:rPr lang="en" altLang="ko-Kore-KR" dirty="0">
+                <a:solidFill>
+                  <a:srgbClr val="333333"/>
+                </a:solidFill>
+                <a:latin typeface="맑은 고딕" panose="020B0503020000020004" pitchFamily="34" charset="-127"/>
+                <a:ea typeface="맑은 고딕" panose="020B0503020000020004" pitchFamily="34" charset="-127"/>
+              </a:rPr>
+              <a:t>, </a:t>
+            </a:r>
+            <a:endParaRPr lang="en" altLang="ko-Kore-KR" dirty="0">
+              <a:solidFill>
+                <a:srgbClr val="333333"/>
+              </a:solidFill>
+              <a:latin typeface="Source Sans Pro" panose="020B0503030403020204" pitchFamily="34" charset="0"/>
+            </a:endParaRPr>
+          </a:p>
+          <a:p>
+            <a:r>
+              <a:rPr lang="ko-KR" altLang="en-US" dirty="0">
+                <a:solidFill>
+                  <a:srgbClr val="333333"/>
+                </a:solidFill>
+                <a:latin typeface="맑은 고딕" panose="020B0503020000020004" pitchFamily="34" charset="-127"/>
+              </a:rPr>
+              <a:t>개체 사이에 존재하는 </a:t>
+            </a:r>
+            <a:r>
+              <a:rPr lang="ko-KR" altLang="en-US" dirty="0">
+                <a:solidFill>
+                  <a:srgbClr val="FF0000"/>
+                </a:solidFill>
+                <a:latin typeface="맑은 고딕" panose="020B0503020000020004" pitchFamily="34" charset="-127"/>
+              </a:rPr>
+              <a:t>관계</a:t>
+            </a:r>
+            <a:r>
+              <a:rPr lang="en-US" altLang="ko-KR" dirty="0">
+                <a:solidFill>
+                  <a:srgbClr val="FF0000"/>
+                </a:solidFill>
+                <a:latin typeface="맑은 고딕" panose="020B0503020000020004" pitchFamily="34" charset="-127"/>
+              </a:rPr>
+              <a:t>(</a:t>
+            </a:r>
+            <a:r>
+              <a:rPr lang="en" altLang="ko-Kore-KR" dirty="0">
+                <a:solidFill>
+                  <a:srgbClr val="FF0000"/>
+                </a:solidFill>
+                <a:latin typeface="맑은 고딕" panose="020B0503020000020004" pitchFamily="34" charset="-127"/>
+                <a:ea typeface="맑은 고딕" panose="020B0503020000020004" pitchFamily="34" charset="-127"/>
+              </a:rPr>
+              <a:t>Relation)</a:t>
+            </a:r>
+            <a:r>
+              <a:rPr lang="ko-KR" altLang="en-US" dirty="0">
+                <a:solidFill>
+                  <a:srgbClr val="333333"/>
+                </a:solidFill>
+                <a:latin typeface="맑은 고딕" panose="020B0503020000020004" pitchFamily="34" charset="-127"/>
+              </a:rPr>
+              <a:t>에 대한 정의와 </a:t>
+            </a:r>
+            <a:endParaRPr lang="ko-KR" altLang="en-US" dirty="0">
+              <a:solidFill>
+                <a:srgbClr val="333333"/>
+              </a:solidFill>
+              <a:latin typeface="Source Sans Pro" panose="020B0503030403020204" pitchFamily="34" charset="0"/>
+            </a:endParaRPr>
+          </a:p>
+          <a:p>
+            <a:r>
+              <a:rPr lang="ko-KR" altLang="en-US" dirty="0">
+                <a:solidFill>
+                  <a:srgbClr val="333333"/>
+                </a:solidFill>
+                <a:latin typeface="맑은 고딕" panose="020B0503020000020004" pitchFamily="34" charset="-127"/>
+              </a:rPr>
+              <a:t>이들이 유지해야 할 </a:t>
+            </a:r>
+            <a:r>
+              <a:rPr lang="ko-KR" altLang="en-US" dirty="0" err="1">
+                <a:solidFill>
+                  <a:srgbClr val="FF0000"/>
+                </a:solidFill>
+                <a:latin typeface="맑은 고딕" panose="020B0503020000020004" pitchFamily="34" charset="-127"/>
+              </a:rPr>
+              <a:t>제약조건</a:t>
+            </a:r>
+            <a:r>
+              <a:rPr lang="ko-KR" altLang="en-US" dirty="0" err="1">
+                <a:solidFill>
+                  <a:srgbClr val="333333"/>
+                </a:solidFill>
+                <a:latin typeface="맑은 고딕" panose="020B0503020000020004" pitchFamily="34" charset="-127"/>
+              </a:rPr>
+              <a:t>들</a:t>
+            </a:r>
+            <a:endParaRPr lang="ko-KR" altLang="en-US" dirty="0">
+              <a:solidFill>
+                <a:srgbClr val="333333"/>
+              </a:solidFill>
+              <a:latin typeface="Source Sans Pro" panose="020B0503030403020204" pitchFamily="34" charset="0"/>
+            </a:endParaRPr>
+          </a:p>
+          <a:p>
+            <a:r>
+              <a:rPr lang="ko-KR" altLang="en-US" dirty="0">
+                <a:solidFill>
+                  <a:srgbClr val="333333"/>
+                </a:solidFill>
+                <a:latin typeface="맑은 고딕" panose="020B0503020000020004" pitchFamily="34" charset="-127"/>
+              </a:rPr>
+              <a:t>을 기술한 것이다</a:t>
+            </a:r>
+            <a:r>
+              <a:rPr lang="en-US" altLang="ko-KR" dirty="0">
+                <a:solidFill>
+                  <a:srgbClr val="333333"/>
+                </a:solidFill>
+                <a:latin typeface="맑은 고딕" panose="020B0503020000020004" pitchFamily="34" charset="-127"/>
+              </a:rPr>
+              <a:t>.</a:t>
+            </a:r>
+          </a:p>
+          <a:p>
+            <a:r>
+              <a:rPr lang="ko-KR" altLang="en-US" dirty="0">
+                <a:solidFill>
+                  <a:srgbClr val="333333"/>
+                </a:solidFill>
+                <a:latin typeface="맑은 고딕" panose="020B0503020000020004" pitchFamily="34" charset="-127"/>
+              </a:rPr>
+              <a:t>사용자의 관점에 따라</a:t>
+            </a:r>
+            <a:r>
+              <a:rPr lang="ko-KR" altLang="en-US" dirty="0"/>
+              <a:t> </a:t>
+            </a:r>
+            <a:r>
+              <a:rPr lang="ko-KR" altLang="en-US" b="1" dirty="0"/>
+              <a:t>외부</a:t>
+            </a:r>
+            <a:r>
+              <a:rPr lang="en-US" altLang="ko-KR" b="1" dirty="0"/>
+              <a:t>, </a:t>
+            </a:r>
+            <a:r>
+              <a:rPr lang="ko-KR" altLang="en-US" b="1" dirty="0"/>
+              <a:t>개념</a:t>
+            </a:r>
+            <a:r>
+              <a:rPr lang="en-US" altLang="ko-KR" b="1" dirty="0"/>
+              <a:t>, </a:t>
+            </a:r>
+            <a:r>
+              <a:rPr lang="ko-KR" altLang="en-US" b="1" dirty="0"/>
+              <a:t>내부 스키마</a:t>
+            </a:r>
+            <a:r>
+              <a:rPr lang="ko-KR" altLang="en-US" dirty="0"/>
+              <a:t>로 구분</a:t>
+            </a:r>
+          </a:p>
+        </p:txBody>
+      </p:sp>
+      <p:sp>
+        <p:nvSpPr>
+          <p:cNvPr id="4" name="TextBox 3">
+            <a:extLst>
+              <a:ext uri="{FF2B5EF4-FFF2-40B4-BE49-F238E27FC236}">
+                <a16:creationId xmlns:a16="http://schemas.microsoft.com/office/drawing/2014/main" id="{232969DE-075E-EC42-87BC-112990DF13F7}"/>
+              </a:ext>
+            </a:extLst>
+          </p:cNvPr>
+          <p:cNvSpPr txBox="1"/>
           <p:nvPr/>
-        </p:nvPicPr>
-        <p:blipFill>
-          <a:blip r:embed="rId3"/>
-          <a:stretch>
-            <a:fillRect/>
-          </a:stretch>
-        </p:blipFill>
+        </p:nvSpPr>
         <p:spPr>
           <a:xfrm>
-            <a:off x="1081217" y="1690687"/>
-            <a:ext cx="4318686" cy="3019569"/>
-          </a:xfrm>
-          <a:prstGeom prst="rect">
-            <a:avLst/>
-          </a:prstGeom>
-        </p:spPr>
-      </p:pic>
-      <p:sp>
-        <p:nvSpPr>
-          <p:cNvPr id="10" name="TextBox 9">
-            <a:extLst>
-              <a:ext uri="{FF2B5EF4-FFF2-40B4-BE49-F238E27FC236}">
-                <a16:creationId xmlns:a16="http://schemas.microsoft.com/office/drawing/2014/main" id="{DB71AEC1-039F-5847-83A0-757F845B7C98}"/>
-              </a:ext>
-            </a:extLst>
-          </p:cNvPr>
-          <p:cNvSpPr txBox="1"/>
-          <p:nvPr/>
-        </p:nvSpPr>
-        <p:spPr>
-          <a:xfrm>
-            <a:off x="4151870" y="5412259"/>
-            <a:ext cx="3623108" cy="369332"/>
+            <a:off x="266700" y="3923615"/>
+            <a:ext cx="10509608" cy="2585323"/>
           </a:xfrm>
           <a:prstGeom prst="rect">
             <a:avLst/>
@@ -4799,41 +7232,161 @@
           <a:lstStyle/>
           <a:p>
             <a:r>
-              <a:rPr kumimoji="1" lang="ko-Kore-KR" altLang="en-US" dirty="0"/>
-              <a:t>가장</a:t>
-            </a:r>
-            <a:r>
-              <a:rPr kumimoji="1" lang="ko-KR" altLang="en-US" dirty="0"/>
-              <a:t> 큰 차이 </a:t>
-            </a:r>
-            <a:r>
-              <a:rPr kumimoji="1" lang="en-US" altLang="ko-KR" dirty="0"/>
-              <a:t>:</a:t>
-            </a:r>
-            <a:r>
-              <a:rPr kumimoji="1" lang="ko-KR" altLang="en-US" dirty="0"/>
-              <a:t> </a:t>
-            </a:r>
-            <a:r>
-              <a:rPr kumimoji="1" lang="ko-Kore-KR" altLang="en-US" dirty="0"/>
-              <a:t>스키마</a:t>
-            </a:r>
-            <a:r>
-              <a:rPr kumimoji="1" lang="en-US" altLang="ko-Kore-KR" dirty="0"/>
+              <a:rPr lang="ko-KR" altLang="en-US" dirty="0"/>
+              <a:t>특징</a:t>
+            </a:r>
+            <a:endParaRPr lang="en-US" altLang="ko-KR" dirty="0"/>
+          </a:p>
+          <a:p>
+            <a:r>
+              <a:rPr lang="en-US" altLang="ko-KR" dirty="0"/>
+              <a:t>1) </a:t>
+            </a:r>
+            <a:r>
+              <a:rPr lang="ko-KR" altLang="en-US" dirty="0"/>
+              <a:t>스키마는 </a:t>
+            </a:r>
+            <a:r>
+              <a:rPr lang="ko-KR" altLang="en-US" b="1" dirty="0"/>
+              <a:t>데이터 사전</a:t>
+            </a:r>
+            <a:r>
+              <a:rPr lang="en-US" altLang="ko-KR" b="1" dirty="0"/>
+              <a:t>(</a:t>
+            </a:r>
+            <a:r>
+              <a:rPr lang="en" altLang="ko-Kore-KR" b="1" dirty="0"/>
+              <a:t>Data Dictionary)</a:t>
+            </a:r>
+            <a:r>
+              <a:rPr lang="ko-KR" altLang="en-US" dirty="0"/>
+              <a:t>에 저장된다</a:t>
+            </a:r>
+            <a:r>
+              <a:rPr lang="en-US" altLang="ko-KR" dirty="0"/>
+              <a:t>.</a:t>
+            </a:r>
+            <a:endParaRPr lang="ko-KR" altLang="en-US" dirty="0"/>
+          </a:p>
+          <a:p>
+            <a:r>
+              <a:rPr lang="ko-KR" altLang="en-US" dirty="0"/>
+              <a:t>*데이터 사전 </a:t>
+            </a:r>
+            <a:r>
+              <a:rPr lang="en-US" altLang="ko-KR" dirty="0"/>
+              <a:t>: </a:t>
+            </a:r>
+            <a:r>
+              <a:rPr lang="ko-KR" altLang="en-US" dirty="0"/>
+              <a:t>시스템 전체에서 나타나는 데이터 항목들에 대한 정보를 지정한 중앙 저장소로</a:t>
+            </a:r>
+            <a:r>
+              <a:rPr lang="en-US" altLang="ko-KR" dirty="0"/>
               <a:t>,</a:t>
             </a:r>
             <a:r>
-              <a:rPr kumimoji="1" lang="ko-KR" altLang="en-US" dirty="0"/>
-              <a:t> 관계의 유무</a:t>
-            </a:r>
-            <a:endParaRPr kumimoji="1" lang="ko-Kore-KR" altLang="en-US" dirty="0"/>
+              <a:rPr lang="ko-KR" altLang="en-US" dirty="0"/>
+              <a:t> </a:t>
+            </a:r>
+            <a:endParaRPr lang="en-US" altLang="ko-KR" dirty="0"/>
+          </a:p>
+          <a:p>
+            <a:r>
+              <a:rPr lang="ko-KR" altLang="en-US" dirty="0"/>
+              <a:t>이 정보에는 항목을 참조하는데 사용되는 </a:t>
+            </a:r>
+            <a:r>
+              <a:rPr lang="ko-KR" altLang="en-US" dirty="0" err="1"/>
+              <a:t>식별자</a:t>
+            </a:r>
+            <a:r>
+              <a:rPr lang="en-US" altLang="ko-KR" dirty="0"/>
+              <a:t>, </a:t>
+            </a:r>
+            <a:r>
+              <a:rPr lang="ko-KR" altLang="en-US" dirty="0"/>
+              <a:t>항목에 대한 </a:t>
+            </a:r>
+            <a:r>
+              <a:rPr lang="ko-KR" altLang="en-US" dirty="0" err="1"/>
+              <a:t>엔티티의</a:t>
+            </a:r>
+            <a:r>
+              <a:rPr lang="ko-KR" altLang="en-US" dirty="0"/>
+              <a:t> 구성요소</a:t>
+            </a:r>
+            <a:r>
+              <a:rPr lang="en-US" altLang="ko-KR" dirty="0"/>
+              <a:t>, </a:t>
+            </a:r>
+            <a:r>
+              <a:rPr lang="ko-KR" altLang="en-US" dirty="0"/>
+              <a:t>항목이 저장되는 곳</a:t>
+            </a:r>
+            <a:r>
+              <a:rPr lang="en-US" altLang="ko-KR" dirty="0"/>
+              <a:t>, </a:t>
+            </a:r>
+          </a:p>
+          <a:p>
+            <a:r>
+              <a:rPr lang="ko-KR" altLang="en-US" dirty="0"/>
+              <a:t>항목을 참조하는 곳 등을 포함</a:t>
+            </a:r>
+          </a:p>
+          <a:p>
+            <a:r>
+              <a:rPr lang="en-US" altLang="ko-KR" dirty="0"/>
+              <a:t>2) </a:t>
+            </a:r>
+            <a:r>
+              <a:rPr lang="ko-KR" altLang="en-US" dirty="0"/>
+              <a:t>현실 세계의 특정한 한 부분의 표현으로서 특정 데이터 모델을 이용해서 만들어지게 된다</a:t>
+            </a:r>
+            <a:r>
+              <a:rPr lang="en-US" altLang="ko-KR" dirty="0"/>
+              <a:t>.</a:t>
+            </a:r>
+            <a:endParaRPr lang="ko-KR" altLang="en-US" dirty="0"/>
+          </a:p>
+          <a:p>
+            <a:r>
+              <a:rPr lang="en-US" altLang="ko-KR" dirty="0"/>
+              <a:t>3) </a:t>
+            </a:r>
+            <a:r>
+              <a:rPr lang="ko-KR" altLang="en-US" dirty="0" err="1"/>
+              <a:t>시불변성</a:t>
+            </a:r>
+            <a:endParaRPr lang="ko-KR" altLang="en-US" dirty="0"/>
+          </a:p>
+          <a:p>
+            <a:r>
+              <a:rPr lang="en-US" altLang="ko-KR" dirty="0"/>
+              <a:t>4) </a:t>
+            </a:r>
+            <a:r>
+              <a:rPr lang="ko-KR" altLang="en-US" dirty="0"/>
+              <a:t>데이터의 구조적 특성을 의미</a:t>
+            </a:r>
+          </a:p>
+          <a:p>
+            <a:r>
+              <a:rPr lang="en-US" altLang="ko-KR" dirty="0"/>
+              <a:t>5) </a:t>
+            </a:r>
+            <a:r>
+              <a:rPr lang="ko-KR" altLang="en-US" dirty="0"/>
+              <a:t>인스턴스에 의해 규정됨</a:t>
+            </a:r>
           </a:p>
         </p:txBody>
       </p:sp>
     </p:spTree>
     <p:extLst>
       <p:ext uri="{BB962C8B-B14F-4D97-AF65-F5344CB8AC3E}">
-        <p14:creationId xmlns:p14="http://schemas.microsoft.com/office/powerpoint/2010/main" val="1811834401"/>
+        <p14:creationId xmlns:p14="http://schemas.microsoft.com/office/powerpoint/2010/main" val="4127940475"/>
       </p:ext>
     </p:extLst>
   </p:cSld>
@@ -4889,542 +7442,70 @@
           </a:p>
         </p:txBody>
       </p:sp>
-      <p:sp>
-        <p:nvSpPr>
-          <p:cNvPr id="3" name="직사각형 2">
-            <a:extLst>
-              <a:ext uri="{FF2B5EF4-FFF2-40B4-BE49-F238E27FC236}">
-                <a16:creationId xmlns:a16="http://schemas.microsoft.com/office/drawing/2014/main" id="{217CA5FA-375C-7E43-A3BE-8045E969FC5A}"/>
-              </a:ext>
-            </a:extLst>
-          </p:cNvPr>
-          <p:cNvSpPr/>
+      <p:pic>
+        <p:nvPicPr>
+          <p:cNvPr id="6" name="그림 5">
+            <a:extLst>
+              <a:ext uri="{FF2B5EF4-FFF2-40B4-BE49-F238E27FC236}">
+                <a16:creationId xmlns:a16="http://schemas.microsoft.com/office/drawing/2014/main" id="{2165A2A8-2AEB-754C-9A99-707175C67B05}"/>
+              </a:ext>
+            </a:extLst>
+          </p:cNvPr>
+          <p:cNvPicPr>
+            <a:picLocks noChangeAspect="1"/>
+          </p:cNvPicPr>
           <p:nvPr/>
-        </p:nvSpPr>
+        </p:nvPicPr>
+        <p:blipFill>
+          <a:blip r:embed="rId3"/>
+          <a:stretch>
+            <a:fillRect/>
+          </a:stretch>
+        </p:blipFill>
         <p:spPr>
           <a:xfrm>
-            <a:off x="453390" y="1560820"/>
-            <a:ext cx="6096000" cy="2308324"/>
+            <a:off x="838200" y="1370330"/>
+            <a:ext cx="4930140" cy="4920908"/>
           </a:xfrm>
           <a:prstGeom prst="rect">
             <a:avLst/>
           </a:prstGeom>
         </p:spPr>
-        <p:txBody>
-          <a:bodyPr>
-            <a:spAutoFit/>
-          </a:bodyPr>
-          <a:lstStyle/>
-          <a:p>
-            <a:r>
-              <a:rPr lang="ko-KR" altLang="en-US" b="1" dirty="0" err="1">
-                <a:solidFill>
-                  <a:srgbClr val="333333"/>
-                </a:solidFill>
-                <a:latin typeface="맑은 고딕" panose="020B0503020000020004" pitchFamily="34" charset="-127"/>
-              </a:rPr>
-              <a:t>스키마</a:t>
-            </a:r>
-            <a:r>
-              <a:rPr lang="ko-KR" altLang="en-US" dirty="0" err="1">
-                <a:solidFill>
-                  <a:srgbClr val="333333"/>
-                </a:solidFill>
-                <a:latin typeface="맑은 고딕" panose="020B0503020000020004" pitchFamily="34" charset="-127"/>
-              </a:rPr>
-              <a:t>란</a:t>
-            </a:r>
-            <a:r>
-              <a:rPr lang="ko-KR" altLang="en-US" dirty="0">
-                <a:solidFill>
-                  <a:srgbClr val="333333"/>
-                </a:solidFill>
-                <a:latin typeface="맑은 고딕" panose="020B0503020000020004" pitchFamily="34" charset="-127"/>
-              </a:rPr>
-              <a:t> </a:t>
-            </a:r>
-            <a:r>
-              <a:rPr lang="en-US" altLang="ko-KR" dirty="0">
-                <a:solidFill>
-                  <a:srgbClr val="333333"/>
-                </a:solidFill>
-                <a:latin typeface="맑은 고딕" panose="020B0503020000020004" pitchFamily="34" charset="-127"/>
-              </a:rPr>
-              <a:t>-</a:t>
-            </a:r>
-            <a:r>
-              <a:rPr lang="ko-KR" altLang="en-US" b="1" dirty="0">
-                <a:solidFill>
-                  <a:srgbClr val="333333"/>
-                </a:solidFill>
-                <a:latin typeface="맑은 고딕" panose="020B0503020000020004" pitchFamily="34" charset="-127"/>
-              </a:rPr>
-              <a:t> </a:t>
-            </a:r>
-            <a:r>
-              <a:rPr lang="ko-KR" altLang="en-US" dirty="0">
-                <a:solidFill>
-                  <a:srgbClr val="FF0000"/>
-                </a:solidFill>
-                <a:latin typeface="맑은 고딕" panose="020B0503020000020004" pitchFamily="34" charset="-127"/>
-              </a:rPr>
-              <a:t>데이터베이스의 구조와 제약조건에 관해 전반적인 명세를 기술한 것</a:t>
-            </a:r>
-            <a:endParaRPr lang="ko-KR" altLang="en-US" dirty="0">
-              <a:solidFill>
-                <a:srgbClr val="333333"/>
-              </a:solidFill>
-              <a:latin typeface="Source Sans Pro" panose="020B0503030403020204" pitchFamily="34" charset="0"/>
-            </a:endParaRPr>
-          </a:p>
-          <a:p>
-            <a:r>
-              <a:rPr lang="ko-KR" altLang="en-US" dirty="0">
-                <a:solidFill>
-                  <a:srgbClr val="333333"/>
-                </a:solidFill>
-                <a:latin typeface="맑은 고딕" panose="020B0503020000020004" pitchFamily="34" charset="-127"/>
-              </a:rPr>
-              <a:t>개체의 특성을 나타내는 </a:t>
-            </a:r>
-            <a:r>
-              <a:rPr lang="ko-KR" altLang="en-US" dirty="0">
-                <a:solidFill>
-                  <a:srgbClr val="FF0000"/>
-                </a:solidFill>
-                <a:latin typeface="맑은 고딕" panose="020B0503020000020004" pitchFamily="34" charset="-127"/>
-              </a:rPr>
-              <a:t>속성</a:t>
-            </a:r>
-            <a:r>
-              <a:rPr lang="en-US" altLang="ko-KR" dirty="0">
-                <a:solidFill>
-                  <a:srgbClr val="FF0000"/>
-                </a:solidFill>
-                <a:latin typeface="맑은 고딕" panose="020B0503020000020004" pitchFamily="34" charset="-127"/>
-              </a:rPr>
-              <a:t>(</a:t>
-            </a:r>
-            <a:r>
-              <a:rPr lang="en" altLang="ko-Kore-KR" dirty="0">
-                <a:solidFill>
-                  <a:srgbClr val="FF0000"/>
-                </a:solidFill>
-                <a:latin typeface="맑은 고딕" panose="020B0503020000020004" pitchFamily="34" charset="-127"/>
-                <a:ea typeface="맑은 고딕" panose="020B0503020000020004" pitchFamily="34" charset="-127"/>
-              </a:rPr>
-              <a:t>Attribute)</a:t>
-            </a:r>
-            <a:r>
-              <a:rPr lang="ko-KR" altLang="en-US" dirty="0">
-                <a:solidFill>
-                  <a:srgbClr val="333333"/>
-                </a:solidFill>
-                <a:latin typeface="맑은 고딕" panose="020B0503020000020004" pitchFamily="34" charset="-127"/>
-              </a:rPr>
-              <a:t>과 </a:t>
-            </a:r>
-            <a:endParaRPr lang="ko-KR" altLang="en-US" dirty="0">
-              <a:solidFill>
-                <a:srgbClr val="333333"/>
-              </a:solidFill>
-              <a:latin typeface="Source Sans Pro" panose="020B0503030403020204" pitchFamily="34" charset="0"/>
-            </a:endParaRPr>
-          </a:p>
-          <a:p>
-            <a:r>
-              <a:rPr lang="ko-KR" altLang="en-US" dirty="0">
-                <a:solidFill>
-                  <a:srgbClr val="333333"/>
-                </a:solidFill>
-                <a:latin typeface="맑은 고딕" panose="020B0503020000020004" pitchFamily="34" charset="-127"/>
-              </a:rPr>
-              <a:t>속성들의 집합으로 이루어진 </a:t>
-            </a:r>
-            <a:r>
-              <a:rPr lang="ko-KR" altLang="en-US" dirty="0">
-                <a:solidFill>
-                  <a:srgbClr val="FF0000"/>
-                </a:solidFill>
-                <a:latin typeface="맑은 고딕" panose="020B0503020000020004" pitchFamily="34" charset="-127"/>
-              </a:rPr>
-              <a:t>개체</a:t>
-            </a:r>
-            <a:r>
-              <a:rPr lang="en-US" altLang="ko-KR" dirty="0">
-                <a:solidFill>
-                  <a:srgbClr val="FF0000"/>
-                </a:solidFill>
-                <a:latin typeface="맑은 고딕" panose="020B0503020000020004" pitchFamily="34" charset="-127"/>
-              </a:rPr>
-              <a:t>(</a:t>
-            </a:r>
-            <a:r>
-              <a:rPr lang="en" altLang="ko-Kore-KR" dirty="0">
-                <a:solidFill>
-                  <a:srgbClr val="FF0000"/>
-                </a:solidFill>
-                <a:latin typeface="맑은 고딕" panose="020B0503020000020004" pitchFamily="34" charset="-127"/>
-                <a:ea typeface="맑은 고딕" panose="020B0503020000020004" pitchFamily="34" charset="-127"/>
-              </a:rPr>
-              <a:t>Entity)</a:t>
-            </a:r>
-            <a:r>
-              <a:rPr lang="en" altLang="ko-Kore-KR" dirty="0">
-                <a:solidFill>
-                  <a:srgbClr val="333333"/>
-                </a:solidFill>
-                <a:latin typeface="맑은 고딕" panose="020B0503020000020004" pitchFamily="34" charset="-127"/>
-                <a:ea typeface="맑은 고딕" panose="020B0503020000020004" pitchFamily="34" charset="-127"/>
-              </a:rPr>
-              <a:t>, </a:t>
-            </a:r>
-            <a:endParaRPr lang="en" altLang="ko-Kore-KR" dirty="0">
-              <a:solidFill>
-                <a:srgbClr val="333333"/>
-              </a:solidFill>
-              <a:latin typeface="Source Sans Pro" panose="020B0503030403020204" pitchFamily="34" charset="0"/>
-            </a:endParaRPr>
-          </a:p>
-          <a:p>
-            <a:r>
-              <a:rPr lang="ko-KR" altLang="en-US" dirty="0">
-                <a:solidFill>
-                  <a:srgbClr val="333333"/>
-                </a:solidFill>
-                <a:latin typeface="맑은 고딕" panose="020B0503020000020004" pitchFamily="34" charset="-127"/>
-              </a:rPr>
-              <a:t>개체 사이에 존재하는 </a:t>
-            </a:r>
-            <a:r>
-              <a:rPr lang="ko-KR" altLang="en-US" dirty="0">
-                <a:solidFill>
-                  <a:srgbClr val="FF0000"/>
-                </a:solidFill>
-                <a:latin typeface="맑은 고딕" panose="020B0503020000020004" pitchFamily="34" charset="-127"/>
-              </a:rPr>
-              <a:t>관계</a:t>
-            </a:r>
-            <a:r>
-              <a:rPr lang="en-US" altLang="ko-KR" dirty="0">
-                <a:solidFill>
-                  <a:srgbClr val="FF0000"/>
-                </a:solidFill>
-                <a:latin typeface="맑은 고딕" panose="020B0503020000020004" pitchFamily="34" charset="-127"/>
-              </a:rPr>
-              <a:t>(</a:t>
-            </a:r>
-            <a:r>
-              <a:rPr lang="en" altLang="ko-Kore-KR" dirty="0">
-                <a:solidFill>
-                  <a:srgbClr val="FF0000"/>
-                </a:solidFill>
-                <a:latin typeface="맑은 고딕" panose="020B0503020000020004" pitchFamily="34" charset="-127"/>
-                <a:ea typeface="맑은 고딕" panose="020B0503020000020004" pitchFamily="34" charset="-127"/>
-              </a:rPr>
-              <a:t>Relation)</a:t>
-            </a:r>
-            <a:r>
-              <a:rPr lang="ko-KR" altLang="en-US" dirty="0">
-                <a:solidFill>
-                  <a:srgbClr val="333333"/>
-                </a:solidFill>
-                <a:latin typeface="맑은 고딕" panose="020B0503020000020004" pitchFamily="34" charset="-127"/>
-              </a:rPr>
-              <a:t>에 대한 정의와 </a:t>
-            </a:r>
-            <a:endParaRPr lang="ko-KR" altLang="en-US" dirty="0">
-              <a:solidFill>
-                <a:srgbClr val="333333"/>
-              </a:solidFill>
-              <a:latin typeface="Source Sans Pro" panose="020B0503030403020204" pitchFamily="34" charset="0"/>
-            </a:endParaRPr>
-          </a:p>
-          <a:p>
-            <a:r>
-              <a:rPr lang="ko-KR" altLang="en-US" dirty="0">
-                <a:solidFill>
-                  <a:srgbClr val="333333"/>
-                </a:solidFill>
-                <a:latin typeface="맑은 고딕" panose="020B0503020000020004" pitchFamily="34" charset="-127"/>
-              </a:rPr>
-              <a:t>이들이 유지해야 할 </a:t>
-            </a:r>
-            <a:r>
-              <a:rPr lang="ko-KR" altLang="en-US" dirty="0" err="1">
-                <a:solidFill>
-                  <a:srgbClr val="FF0000"/>
-                </a:solidFill>
-                <a:latin typeface="맑은 고딕" panose="020B0503020000020004" pitchFamily="34" charset="-127"/>
-              </a:rPr>
-              <a:t>제약조건</a:t>
-            </a:r>
-            <a:r>
-              <a:rPr lang="ko-KR" altLang="en-US" dirty="0" err="1">
-                <a:solidFill>
-                  <a:srgbClr val="333333"/>
-                </a:solidFill>
-                <a:latin typeface="맑은 고딕" panose="020B0503020000020004" pitchFamily="34" charset="-127"/>
-              </a:rPr>
-              <a:t>들</a:t>
-            </a:r>
-            <a:endParaRPr lang="ko-KR" altLang="en-US" dirty="0">
-              <a:solidFill>
-                <a:srgbClr val="333333"/>
-              </a:solidFill>
-              <a:latin typeface="Source Sans Pro" panose="020B0503030403020204" pitchFamily="34" charset="0"/>
-            </a:endParaRPr>
-          </a:p>
-          <a:p>
-            <a:r>
-              <a:rPr lang="ko-KR" altLang="en-US" dirty="0">
-                <a:solidFill>
-                  <a:srgbClr val="333333"/>
-                </a:solidFill>
-                <a:latin typeface="맑은 고딕" panose="020B0503020000020004" pitchFamily="34" charset="-127"/>
-              </a:rPr>
-              <a:t>을 기술한 것이다</a:t>
-            </a:r>
-            <a:r>
-              <a:rPr lang="en-US" altLang="ko-KR" dirty="0">
-                <a:solidFill>
-                  <a:srgbClr val="333333"/>
-                </a:solidFill>
-                <a:latin typeface="맑은 고딕" panose="020B0503020000020004" pitchFamily="34" charset="-127"/>
-              </a:rPr>
-              <a:t>.</a:t>
-            </a:r>
-          </a:p>
-          <a:p>
-            <a:r>
-              <a:rPr lang="ko-KR" altLang="en-US" dirty="0">
-                <a:solidFill>
-                  <a:srgbClr val="333333"/>
-                </a:solidFill>
-                <a:latin typeface="맑은 고딕" panose="020B0503020000020004" pitchFamily="34" charset="-127"/>
-              </a:rPr>
-              <a:t>사용자의 관점에 따라</a:t>
-            </a:r>
-            <a:r>
-              <a:rPr lang="ko-KR" altLang="en-US" dirty="0"/>
-              <a:t> </a:t>
-            </a:r>
-            <a:r>
-              <a:rPr lang="ko-KR" altLang="en-US" b="1" dirty="0"/>
-              <a:t>외부</a:t>
-            </a:r>
-            <a:r>
-              <a:rPr lang="en-US" altLang="ko-KR" b="1" dirty="0"/>
-              <a:t>, </a:t>
-            </a:r>
-            <a:r>
-              <a:rPr lang="ko-KR" altLang="en-US" b="1" dirty="0"/>
-              <a:t>개념</a:t>
-            </a:r>
-            <a:r>
-              <a:rPr lang="en-US" altLang="ko-KR" b="1" dirty="0"/>
-              <a:t>, </a:t>
-            </a:r>
-            <a:r>
-              <a:rPr lang="ko-KR" altLang="en-US" b="1" dirty="0"/>
-              <a:t>내부 </a:t>
-            </a:r>
-            <a:r>
-              <a:rPr lang="ko-KR" altLang="en-US" b="1"/>
-              <a:t>스키마</a:t>
-            </a:r>
-            <a:r>
-              <a:rPr lang="ko-KR" altLang="en-US"/>
-              <a:t>로 구분</a:t>
-            </a:r>
-            <a:endParaRPr lang="ko-KR" altLang="en-US" dirty="0"/>
-          </a:p>
-        </p:txBody>
-      </p:sp>
-      <p:sp>
-        <p:nvSpPr>
-          <p:cNvPr id="4" name="TextBox 3">
-            <a:extLst>
-              <a:ext uri="{FF2B5EF4-FFF2-40B4-BE49-F238E27FC236}">
-                <a16:creationId xmlns:a16="http://schemas.microsoft.com/office/drawing/2014/main" id="{232969DE-075E-EC42-87BC-112990DF13F7}"/>
-              </a:ext>
-            </a:extLst>
-          </p:cNvPr>
-          <p:cNvSpPr txBox="1"/>
+      </p:pic>
+      <p:pic>
+        <p:nvPicPr>
+          <p:cNvPr id="8" name="그림 7" descr="텍스트이(가) 표시된 사진&#10;&#10;자동 생성된 설명">
+            <a:extLst>
+              <a:ext uri="{FF2B5EF4-FFF2-40B4-BE49-F238E27FC236}">
+                <a16:creationId xmlns:a16="http://schemas.microsoft.com/office/drawing/2014/main" id="{7EAE1345-59BE-8349-B9B3-9E7842C13461}"/>
+              </a:ext>
+            </a:extLst>
+          </p:cNvPr>
+          <p:cNvPicPr>
+            <a:picLocks noChangeAspect="1"/>
+          </p:cNvPicPr>
           <p:nvPr/>
-        </p:nvSpPr>
+        </p:nvPicPr>
+        <p:blipFill>
+          <a:blip r:embed="rId4"/>
+          <a:stretch>
+            <a:fillRect/>
+          </a:stretch>
+        </p:blipFill>
         <p:spPr>
           <a:xfrm>
-            <a:off x="266700" y="3923615"/>
-            <a:ext cx="10509608" cy="2585323"/>
+            <a:off x="5768340" y="1027905"/>
+            <a:ext cx="5821680" cy="5285157"/>
           </a:xfrm>
           <a:prstGeom prst="rect">
             <a:avLst/>
           </a:prstGeom>
-          <a:noFill/>
         </p:spPr>
-        <p:txBody>
-          <a:bodyPr wrap="none" rtlCol="0">
-            <a:spAutoFit/>
-          </a:bodyPr>
-          <a:lstStyle/>
-          <a:p>
-            <a:r>
-              <a:rPr lang="ko-KR" altLang="en-US" dirty="0"/>
-              <a:t>특징</a:t>
-            </a:r>
-            <a:endParaRPr lang="en-US" altLang="ko-KR" dirty="0"/>
-          </a:p>
-          <a:p>
-            <a:r>
-              <a:rPr lang="en-US" altLang="ko-KR" dirty="0"/>
-              <a:t>1) </a:t>
-            </a:r>
-            <a:r>
-              <a:rPr lang="ko-KR" altLang="en-US" dirty="0"/>
-              <a:t>스키마는 </a:t>
-            </a:r>
-            <a:r>
-              <a:rPr lang="ko-KR" altLang="en-US" b="1" dirty="0"/>
-              <a:t>데이터 사전</a:t>
-            </a:r>
-            <a:r>
-              <a:rPr lang="en-US" altLang="ko-KR" b="1" dirty="0"/>
-              <a:t>(</a:t>
-            </a:r>
-            <a:r>
-              <a:rPr lang="en" altLang="ko-Kore-KR" b="1" dirty="0"/>
-              <a:t>Data Dictionary)</a:t>
-            </a:r>
-            <a:r>
-              <a:rPr lang="ko-KR" altLang="en-US" dirty="0"/>
-              <a:t>에 저장된다</a:t>
-            </a:r>
-            <a:r>
-              <a:rPr lang="en-US" altLang="ko-KR" dirty="0"/>
-              <a:t>.</a:t>
-            </a:r>
-            <a:endParaRPr lang="ko-KR" altLang="en-US" dirty="0"/>
-          </a:p>
-          <a:p>
-            <a:r>
-              <a:rPr lang="ko-KR" altLang="en-US" dirty="0"/>
-              <a:t>*데이터 사전 </a:t>
-            </a:r>
-            <a:r>
-              <a:rPr lang="en-US" altLang="ko-KR" dirty="0"/>
-              <a:t>: </a:t>
-            </a:r>
-            <a:r>
-              <a:rPr lang="ko-KR" altLang="en-US" dirty="0"/>
-              <a:t>시스템 전체에서 나타나는 데이터 항목들에 대한 정보를 지정한 중앙 저장소로</a:t>
-            </a:r>
-            <a:r>
-              <a:rPr lang="en-US" altLang="ko-KR" dirty="0"/>
-              <a:t>,</a:t>
-            </a:r>
-            <a:r>
-              <a:rPr lang="ko-KR" altLang="en-US" dirty="0"/>
-              <a:t> </a:t>
-            </a:r>
-            <a:endParaRPr lang="en-US" altLang="ko-KR" dirty="0"/>
-          </a:p>
-          <a:p>
-            <a:r>
-              <a:rPr lang="ko-KR" altLang="en-US" dirty="0"/>
-              <a:t>이 정보에는 항목을 참조하는데 사용되는 </a:t>
-            </a:r>
-            <a:r>
-              <a:rPr lang="ko-KR" altLang="en-US" dirty="0" err="1"/>
-              <a:t>식별자</a:t>
-            </a:r>
-            <a:r>
-              <a:rPr lang="en-US" altLang="ko-KR" dirty="0"/>
-              <a:t>, </a:t>
-            </a:r>
-            <a:r>
-              <a:rPr lang="ko-KR" altLang="en-US" dirty="0"/>
-              <a:t>항목에 대한 </a:t>
-            </a:r>
-            <a:r>
-              <a:rPr lang="ko-KR" altLang="en-US" dirty="0" err="1"/>
-              <a:t>엔티티의</a:t>
-            </a:r>
-            <a:r>
-              <a:rPr lang="ko-KR" altLang="en-US" dirty="0"/>
-              <a:t> 구성요소</a:t>
-            </a:r>
-            <a:r>
-              <a:rPr lang="en-US" altLang="ko-KR" dirty="0"/>
-              <a:t>, </a:t>
-            </a:r>
-            <a:r>
-              <a:rPr lang="ko-KR" altLang="en-US" dirty="0"/>
-              <a:t>항목이 저장되는 곳</a:t>
-            </a:r>
-            <a:r>
-              <a:rPr lang="en-US" altLang="ko-KR" dirty="0"/>
-              <a:t>, </a:t>
-            </a:r>
-          </a:p>
-          <a:p>
-            <a:r>
-              <a:rPr lang="ko-KR" altLang="en-US" dirty="0"/>
-              <a:t>항목을 참조하는 곳 등을 포함</a:t>
-            </a:r>
-          </a:p>
-          <a:p>
-            <a:r>
-              <a:rPr lang="en-US" altLang="ko-KR" dirty="0"/>
-              <a:t>2) </a:t>
-            </a:r>
-            <a:r>
-              <a:rPr lang="ko-KR" altLang="en-US" dirty="0"/>
-              <a:t>현실 세계의 특정한 한 부분의 표현으로서 특정 데이터 모델을 이용해서 만들어지게 된다</a:t>
-            </a:r>
-            <a:r>
-              <a:rPr lang="en-US" altLang="ko-KR" dirty="0"/>
-              <a:t>.</a:t>
-            </a:r>
-            <a:endParaRPr lang="ko-KR" altLang="en-US" dirty="0"/>
-          </a:p>
-          <a:p>
-            <a:r>
-              <a:rPr lang="en-US" altLang="ko-KR" dirty="0"/>
-              <a:t>3) </a:t>
-            </a:r>
-            <a:r>
-              <a:rPr lang="ko-KR" altLang="en-US" dirty="0" err="1"/>
-              <a:t>시불변성</a:t>
-            </a:r>
-            <a:endParaRPr lang="ko-KR" altLang="en-US" dirty="0"/>
-          </a:p>
-          <a:p>
-            <a:r>
-              <a:rPr lang="en-US" altLang="ko-KR" dirty="0"/>
-              <a:t>4) </a:t>
-            </a:r>
-            <a:r>
-              <a:rPr lang="ko-KR" altLang="en-US" dirty="0"/>
-              <a:t>데이터의 구조적 특성을 의미</a:t>
-            </a:r>
-          </a:p>
-          <a:p>
-            <a:r>
-              <a:rPr lang="en-US" altLang="ko-KR" dirty="0"/>
-              <a:t>5) </a:t>
-            </a:r>
-            <a:r>
-              <a:rPr lang="ko-KR" altLang="en-US" dirty="0"/>
-              <a:t>인스턴스에 의해 규정됨</a:t>
-            </a:r>
-          </a:p>
-        </p:txBody>
-      </p:sp>
+      </p:pic>
     </p:spTree>
     <p:extLst>
       <p:ext uri="{BB962C8B-B14F-4D97-AF65-F5344CB8AC3E}">
-        <p14:creationId xmlns:p14="http://schemas.microsoft.com/office/powerpoint/2010/main" val="4127940475"/>
+        <p14:creationId xmlns:p14="http://schemas.microsoft.com/office/powerpoint/2010/main" val="2471893424"/>
       </p:ext>
     </p:extLst>
   </p:cSld>
@@ -5473,19 +7554,49 @@
           <a:lstStyle/>
           <a:p>
             <a:r>
-              <a:rPr kumimoji="1" lang="en-US" altLang="ko-Kore-KR" dirty="0"/>
-              <a:t>reference</a:t>
+              <a:rPr kumimoji="1" lang="ko-KR" altLang="en-US" dirty="0"/>
+              <a:t>스키마</a:t>
             </a:r>
             <a:endParaRPr kumimoji="1" lang="ko-Kore-KR" altLang="en-US" dirty="0"/>
           </a:p>
         </p:txBody>
       </p:sp>
-      <p:sp>
-        <p:nvSpPr>
-          <p:cNvPr id="4" name="TextBox 3">
-            <a:extLst>
-              <a:ext uri="{FF2B5EF4-FFF2-40B4-BE49-F238E27FC236}">
-                <a16:creationId xmlns:a16="http://schemas.microsoft.com/office/drawing/2014/main" id="{1EA78D8C-86A1-D74D-AB98-A84F1A1DCB45}"/>
+      <p:pic>
+        <p:nvPicPr>
+          <p:cNvPr id="5" name="그림 4">
+            <a:extLst>
+              <a:ext uri="{FF2B5EF4-FFF2-40B4-BE49-F238E27FC236}">
+                <a16:creationId xmlns:a16="http://schemas.microsoft.com/office/drawing/2014/main" id="{5CBB8B4A-6041-7541-8EF8-EC34454F49D6}"/>
+              </a:ext>
+            </a:extLst>
+          </p:cNvPr>
+          <p:cNvPicPr>
+            <a:picLocks noChangeAspect="1"/>
+          </p:cNvPicPr>
+          <p:nvPr/>
+        </p:nvPicPr>
+        <p:blipFill>
+          <a:blip r:embed="rId2"/>
+          <a:stretch>
+            <a:fillRect/>
+          </a:stretch>
+        </p:blipFill>
+        <p:spPr>
+          <a:xfrm>
+            <a:off x="1208087" y="3079750"/>
+            <a:ext cx="6261100" cy="698500"/>
+          </a:xfrm>
+          <a:prstGeom prst="rect">
+            <a:avLst/>
+          </a:prstGeom>
+        </p:spPr>
+      </p:pic>
+      <p:sp>
+        <p:nvSpPr>
+          <p:cNvPr id="6" name="TextBox 5">
+            <a:extLst>
+              <a:ext uri="{FF2B5EF4-FFF2-40B4-BE49-F238E27FC236}">
+                <a16:creationId xmlns:a16="http://schemas.microsoft.com/office/drawing/2014/main" id="{3D0BB651-E167-5D44-86A7-0C3623D0E254}"/>
               </a:ext>
             </a:extLst>
           </p:cNvPr>
@@ -5494,8 +7605,8 @@
         </p:nvSpPr>
         <p:spPr>
           <a:xfrm>
-            <a:off x="483476" y="2274838"/>
-            <a:ext cx="9895466" cy="2308324"/>
+            <a:off x="1264756" y="4100513"/>
+            <a:ext cx="9627379" cy="369332"/>
           </a:xfrm>
           <a:prstGeom prst="rect">
             <a:avLst/>
@@ -5509,55 +7620,33 @@
           <a:lstStyle/>
           <a:p>
             <a:r>
-              <a:rPr kumimoji="1" lang="en" altLang="ko-Kore-KR" dirty="0">
-                <a:hlinkClick r:id="rId2"/>
-              </a:rPr>
-              <a:t>https://mjmjmj98.tistory.com/43</a:t>
-            </a:r>
-            <a:endParaRPr kumimoji="1" lang="en" altLang="ko-Kore-KR" dirty="0"/>
-          </a:p>
-          <a:p>
-            <a:endParaRPr kumimoji="1" lang="en" altLang="ko-Kore-KR" dirty="0"/>
-          </a:p>
-          <a:p>
-            <a:r>
-              <a:rPr kumimoji="1" lang="en" altLang="ko-Kore-KR" dirty="0">
-                <a:hlinkClick r:id="rId3"/>
-              </a:rPr>
-              <a:t>https://github.com/JaeYeopHan/Interview_Question_for_Beginner/tree/master/Database</a:t>
-            </a:r>
-            <a:endParaRPr kumimoji="1" lang="en" altLang="ko-Kore-KR" dirty="0"/>
-          </a:p>
-          <a:p>
-            <a:endParaRPr kumimoji="1" lang="en-US" altLang="ko-Kore-KR" dirty="0"/>
-          </a:p>
-          <a:p>
-            <a:r>
-              <a:rPr kumimoji="1" lang="en" altLang="ko-Kore-KR" dirty="0">
-                <a:hlinkClick r:id="rId4"/>
-              </a:rPr>
-              <a:t>https://github.com/gyoogle/tech-interview-for-developer/tree/master/Computer%20Science/Database</a:t>
-            </a:r>
-            <a:endParaRPr kumimoji="1" lang="en" altLang="ko-Kore-KR" dirty="0"/>
-          </a:p>
-          <a:p>
-            <a:endParaRPr kumimoji="1" lang="en" altLang="ko-Kore-KR" dirty="0"/>
-          </a:p>
-          <a:p>
-            <a:r>
-              <a:rPr kumimoji="1" lang="en" altLang="ko-Kore-KR" dirty="0"/>
-              <a:t>https://</a:t>
-            </a:r>
-            <a:r>
-              <a:rPr kumimoji="1" lang="en" altLang="ko-Kore-KR" dirty="0" err="1"/>
-              <a:t>blog.naver.com</a:t>
-            </a:r>
-            <a:r>
-              <a:rPr kumimoji="1" lang="en" altLang="ko-Kore-KR" dirty="0"/>
-              <a:t>/sjs2018/222471823096</a:t>
-            </a:r>
-          </a:p>
-          <a:p>
+              <a:rPr kumimoji="1" lang="ko-Kore-KR" altLang="en-US" dirty="0"/>
+              <a:t>위</a:t>
+            </a:r>
+            <a:r>
+              <a:rPr kumimoji="1" lang="ko-KR" altLang="en-US" dirty="0"/>
+              <a:t> 그림이 스키마 예시이고 </a:t>
+            </a:r>
+            <a:r>
+              <a:rPr lang="ko-KR" altLang="en-US" dirty="0"/>
+              <a:t>정의된 스키마에 따라 </a:t>
+            </a:r>
+            <a:r>
+              <a:rPr lang="en" altLang="ko-Kore-KR" dirty="0"/>
+              <a:t>DB</a:t>
+            </a:r>
+            <a:r>
+              <a:rPr lang="ko-KR" altLang="en-US" dirty="0"/>
+              <a:t>에 실제로 저장된 값이 인스턴스</a:t>
+            </a:r>
+            <a:r>
+              <a:rPr lang="en-US" altLang="ko-KR" dirty="0"/>
+              <a:t>(</a:t>
+            </a:r>
+            <a:r>
+              <a:rPr lang="en" altLang="ko-Kore-KR" dirty="0"/>
+              <a:t>instance) </a:t>
+            </a:r>
             <a:endParaRPr kumimoji="1" lang="ko-Kore-KR" altLang="en-US" dirty="0"/>
           </a:p>
         </p:txBody>

</xml_diff>